<commit_message>
script for extracting rewards from results after long run
</commit_message>
<xml_diff>
--- a/docs/mcts_thoughts.pptx
+++ b/docs/mcts_thoughts.pptx
@@ -6,6 +6,9 @@
   </p:sldMasterIdLst>
   <p:sldIdLst>
     <p:sldId id="256" r:id="rId2"/>
+    <p:sldId id="257" r:id="rId3"/>
+    <p:sldId id="258" r:id="rId4"/>
+    <p:sldId id="259" r:id="rId5"/>
   </p:sldIdLst>
   <p:sldSz cx="12192000" cy="6858000"/>
   <p:notesSz cx="6858000" cy="9144000"/>
@@ -104,6 +107,11 @@
       </a:defRPr>
     </a:lvl9pPr>
   </p:defaultTextStyle>
+  <p:extLst>
+    <p:ext uri="{EFAFB233-063F-42B5-8137-9DF3F51BA10A}">
+      <p15:sldGuideLst xmlns:p15="http://schemas.microsoft.com/office/powerpoint/2012/main"/>
+    </p:ext>
+  </p:extLst>
 </p:presentation>
 </file>
 
@@ -256,7 +264,7 @@
           <a:p>
             <a:fld id="{5EBA1020-A755-4E25-8AE7-0714D8187208}" type="datetimeFigureOut">
               <a:rPr lang="he-IL" smtClean="0"/>
-              <a:t>י"ח/תשרי/תשפ"א</a:t>
+              <a:t>ג'/חשון/תשפ"א</a:t>
             </a:fld>
             <a:endParaRPr lang="he-IL"/>
           </a:p>
@@ -456,7 +464,7 @@
           <a:p>
             <a:fld id="{5EBA1020-A755-4E25-8AE7-0714D8187208}" type="datetimeFigureOut">
               <a:rPr lang="he-IL" smtClean="0"/>
-              <a:t>י"ח/תשרי/תשפ"א</a:t>
+              <a:t>ג'/חשון/תשפ"א</a:t>
             </a:fld>
             <a:endParaRPr lang="he-IL"/>
           </a:p>
@@ -666,7 +674,7 @@
           <a:p>
             <a:fld id="{5EBA1020-A755-4E25-8AE7-0714D8187208}" type="datetimeFigureOut">
               <a:rPr lang="he-IL" smtClean="0"/>
-              <a:t>י"ח/תשרי/תשפ"א</a:t>
+              <a:t>ג'/חשון/תשפ"א</a:t>
             </a:fld>
             <a:endParaRPr lang="he-IL"/>
           </a:p>
@@ -866,7 +874,7 @@
           <a:p>
             <a:fld id="{5EBA1020-A755-4E25-8AE7-0714D8187208}" type="datetimeFigureOut">
               <a:rPr lang="he-IL" smtClean="0"/>
-              <a:t>י"ח/תשרי/תשפ"א</a:t>
+              <a:t>ג'/חשון/תשפ"א</a:t>
             </a:fld>
             <a:endParaRPr lang="he-IL"/>
           </a:p>
@@ -1142,7 +1150,7 @@
           <a:p>
             <a:fld id="{5EBA1020-A755-4E25-8AE7-0714D8187208}" type="datetimeFigureOut">
               <a:rPr lang="he-IL" smtClean="0"/>
-              <a:t>י"ח/תשרי/תשפ"א</a:t>
+              <a:t>ג'/חשון/תשפ"א</a:t>
             </a:fld>
             <a:endParaRPr lang="he-IL"/>
           </a:p>
@@ -1410,7 +1418,7 @@
           <a:p>
             <a:fld id="{5EBA1020-A755-4E25-8AE7-0714D8187208}" type="datetimeFigureOut">
               <a:rPr lang="he-IL" smtClean="0"/>
-              <a:t>י"ח/תשרי/תשפ"א</a:t>
+              <a:t>ג'/חשון/תשפ"א</a:t>
             </a:fld>
             <a:endParaRPr lang="he-IL"/>
           </a:p>
@@ -1825,7 +1833,7 @@
           <a:p>
             <a:fld id="{5EBA1020-A755-4E25-8AE7-0714D8187208}" type="datetimeFigureOut">
               <a:rPr lang="he-IL" smtClean="0"/>
-              <a:t>י"ח/תשרי/תשפ"א</a:t>
+              <a:t>ג'/חשון/תשפ"א</a:t>
             </a:fld>
             <a:endParaRPr lang="he-IL"/>
           </a:p>
@@ -1967,7 +1975,7 @@
           <a:p>
             <a:fld id="{5EBA1020-A755-4E25-8AE7-0714D8187208}" type="datetimeFigureOut">
               <a:rPr lang="he-IL" smtClean="0"/>
-              <a:t>י"ח/תשרי/תשפ"א</a:t>
+              <a:t>ג'/חשון/תשפ"א</a:t>
             </a:fld>
             <a:endParaRPr lang="he-IL"/>
           </a:p>
@@ -2080,7 +2088,7 @@
           <a:p>
             <a:fld id="{5EBA1020-A755-4E25-8AE7-0714D8187208}" type="datetimeFigureOut">
               <a:rPr lang="he-IL" smtClean="0"/>
-              <a:t>י"ח/תשרי/תשפ"א</a:t>
+              <a:t>ג'/חשון/תשפ"א</a:t>
             </a:fld>
             <a:endParaRPr lang="he-IL"/>
           </a:p>
@@ -2393,7 +2401,7 @@
           <a:p>
             <a:fld id="{5EBA1020-A755-4E25-8AE7-0714D8187208}" type="datetimeFigureOut">
               <a:rPr lang="he-IL" smtClean="0"/>
-              <a:t>י"ח/תשרי/תשפ"א</a:t>
+              <a:t>ג'/חשון/תשפ"א</a:t>
             </a:fld>
             <a:endParaRPr lang="he-IL"/>
           </a:p>
@@ -2682,7 +2690,7 @@
           <a:p>
             <a:fld id="{5EBA1020-A755-4E25-8AE7-0714D8187208}" type="datetimeFigureOut">
               <a:rPr lang="he-IL" smtClean="0"/>
-              <a:t>י"ח/תשרי/תשפ"א</a:t>
+              <a:t>ג'/חשון/תשפ"א</a:t>
             </a:fld>
             <a:endParaRPr lang="he-IL"/>
           </a:p>
@@ -2925,7 +2933,7 @@
           <a:p>
             <a:fld id="{5EBA1020-A755-4E25-8AE7-0714D8187208}" type="datetimeFigureOut">
               <a:rPr lang="he-IL" smtClean="0"/>
-              <a:t>י"ח/תשרי/תשפ"א</a:t>
+              <a:t>ג'/חשון/תשפ"א</a:t>
             </a:fld>
             <a:endParaRPr lang="he-IL"/>
           </a:p>
@@ -3344,58 +3352,1253 @@
       </p:grpSpPr>
       <p:sp>
         <p:nvSpPr>
-          <p:cNvPr id="2" name="Title 1">
-            <a:extLst>
-              <a:ext uri="{FF2B5EF4-FFF2-40B4-BE49-F238E27FC236}">
-                <a16:creationId xmlns:a16="http://schemas.microsoft.com/office/drawing/2014/main" id="{95BFEC8B-354D-4EB9-BE8F-65BC7E4EFDEC}"/>
-              </a:ext>
-            </a:extLst>
-          </p:cNvPr>
-          <p:cNvSpPr>
-            <a:spLocks noGrp="1"/>
-          </p:cNvSpPr>
-          <p:nvPr>
-            <p:ph type="ctrTitle"/>
-          </p:nvPr>
-        </p:nvSpPr>
-        <p:spPr/>
-        <p:txBody>
-          <a:bodyPr/>
-          <a:lstStyle/>
-          <a:p>
-            <a:endParaRPr lang="he-IL"/>
-          </a:p>
-        </p:txBody>
-      </p:sp>
-      <p:sp>
-        <p:nvSpPr>
-          <p:cNvPr id="3" name="Subtitle 2">
-            <a:extLst>
-              <a:ext uri="{FF2B5EF4-FFF2-40B4-BE49-F238E27FC236}">
-                <a16:creationId xmlns:a16="http://schemas.microsoft.com/office/drawing/2014/main" id="{C725F3D9-93B8-4839-8219-3A1EC89214C7}"/>
-              </a:ext>
-            </a:extLst>
-          </p:cNvPr>
-          <p:cNvSpPr>
-            <a:spLocks noGrp="1"/>
-          </p:cNvSpPr>
-          <p:nvPr>
-            <p:ph type="subTitle" idx="1"/>
-          </p:nvPr>
-        </p:nvSpPr>
-        <p:spPr/>
-        <p:txBody>
-          <a:bodyPr/>
-          <a:lstStyle/>
-          <a:p>
-            <a:endParaRPr lang="he-IL"/>
-          </a:p>
-        </p:txBody>
-      </p:sp>
+          <p:cNvPr id="4" name="TextBox 3">
+            <a:extLst>
+              <a:ext uri="{FF2B5EF4-FFF2-40B4-BE49-F238E27FC236}">
+                <a16:creationId xmlns:a16="http://schemas.microsoft.com/office/drawing/2014/main" id="{09F00A3D-C89D-4CA8-992E-D1C8F1C70DA9}"/>
+              </a:ext>
+            </a:extLst>
+          </p:cNvPr>
+          <p:cNvSpPr txBox="1"/>
+          <p:nvPr/>
+        </p:nvSpPr>
+        <p:spPr>
+          <a:xfrm>
+            <a:off x="3390180" y="345057"/>
+            <a:ext cx="5745193" cy="646331"/>
+          </a:xfrm>
+          <a:prstGeom prst="rect">
+            <a:avLst/>
+          </a:prstGeom>
+          <a:noFill/>
+        </p:spPr>
+        <p:txBody>
+          <a:bodyPr wrap="square" rtlCol="1">
+            <a:spAutoFit/>
+          </a:bodyPr>
+          <a:lstStyle/>
+          <a:p>
+            <a:r>
+              <a:rPr lang="en-US" sz="3600" dirty="0"/>
+              <a:t>Monte Carlo tree search</a:t>
+            </a:r>
+            <a:endParaRPr lang="he-IL" sz="3600" dirty="0"/>
+          </a:p>
+        </p:txBody>
+      </p:sp>
+      <p:pic>
+        <p:nvPicPr>
+          <p:cNvPr id="1028" name="Picture 4">
+            <a:extLst>
+              <a:ext uri="{FF2B5EF4-FFF2-40B4-BE49-F238E27FC236}">
+                <a16:creationId xmlns:a16="http://schemas.microsoft.com/office/drawing/2014/main" id="{BB7280B3-1B0C-430F-99E6-461D5A29BA47}"/>
+              </a:ext>
+            </a:extLst>
+          </p:cNvPr>
+          <p:cNvPicPr>
+            <a:picLocks noChangeAspect="1" noChangeArrowheads="1"/>
+          </p:cNvPicPr>
+          <p:nvPr/>
+        </p:nvPicPr>
+        <p:blipFill>
+          <a:blip r:embed="rId2">
+            <a:extLst>
+              <a:ext uri="{28A0092B-C50C-407E-A947-70E740481C1C}">
+                <a14:useLocalDpi xmlns:a14="http://schemas.microsoft.com/office/drawing/2010/main" val="0"/>
+              </a:ext>
+            </a:extLst>
+          </a:blip>
+          <a:srcRect/>
+          <a:stretch>
+            <a:fillRect/>
+          </a:stretch>
+        </p:blipFill>
+        <p:spPr bwMode="auto">
+          <a:xfrm>
+            <a:off x="0" y="1209675"/>
+            <a:ext cx="12192000" cy="3759200"/>
+          </a:xfrm>
+          <a:prstGeom prst="rect">
+            <a:avLst/>
+          </a:prstGeom>
+          <a:noFill/>
+          <a:extLst>
+            <a:ext uri="{909E8E84-426E-40DD-AFC4-6F175D3DCCD1}">
+              <a14:hiddenFill xmlns:a14="http://schemas.microsoft.com/office/drawing/2010/main">
+                <a:solidFill>
+                  <a:srgbClr val="FFFFFF"/>
+                </a:solidFill>
+              </a14:hiddenFill>
+            </a:ext>
+          </a:extLst>
+        </p:spPr>
+      </p:pic>
+      <p:sp>
+        <p:nvSpPr>
+          <p:cNvPr id="5" name="TextBox 4">
+            <a:extLst>
+              <a:ext uri="{FF2B5EF4-FFF2-40B4-BE49-F238E27FC236}">
+                <a16:creationId xmlns:a16="http://schemas.microsoft.com/office/drawing/2014/main" id="{EF3723D5-3F59-43C7-8E3F-083190315D9D}"/>
+              </a:ext>
+            </a:extLst>
+          </p:cNvPr>
+          <p:cNvSpPr txBox="1"/>
+          <p:nvPr/>
+        </p:nvSpPr>
+        <p:spPr>
+          <a:xfrm>
+            <a:off x="1017915" y="5756506"/>
+            <a:ext cx="4744529" cy="461665"/>
+          </a:xfrm>
+          <a:prstGeom prst="rect">
+            <a:avLst/>
+          </a:prstGeom>
+        </p:spPr>
+        <p:style>
+          <a:lnRef idx="2">
+            <a:schemeClr val="accent5"/>
+          </a:lnRef>
+          <a:fillRef idx="1">
+            <a:schemeClr val="lt1"/>
+          </a:fillRef>
+          <a:effectRef idx="0">
+            <a:schemeClr val="accent5"/>
+          </a:effectRef>
+          <a:fontRef idx="minor">
+            <a:schemeClr val="dk1"/>
+          </a:fontRef>
+        </p:style>
+        <p:txBody>
+          <a:bodyPr wrap="square" rtlCol="1">
+            <a:spAutoFit/>
+          </a:bodyPr>
+          <a:lstStyle/>
+          <a:p>
+            <a:r>
+              <a:rPr lang="en-US" sz="2400" dirty="0"/>
+              <a:t>Random/heuristic/net-policy/etc..</a:t>
+            </a:r>
+            <a:endParaRPr lang="he-IL" sz="2400" dirty="0"/>
+          </a:p>
+        </p:txBody>
+      </p:sp>
+      <p:sp>
+        <p:nvSpPr>
+          <p:cNvPr id="6" name="TextBox 5">
+            <a:extLst>
+              <a:ext uri="{FF2B5EF4-FFF2-40B4-BE49-F238E27FC236}">
+                <a16:creationId xmlns:a16="http://schemas.microsoft.com/office/drawing/2014/main" id="{9BF7E234-3D99-4E3F-BE3F-3BB1D8FB6E40}"/>
+              </a:ext>
+            </a:extLst>
+          </p:cNvPr>
+          <p:cNvSpPr txBox="1"/>
+          <p:nvPr/>
+        </p:nvSpPr>
+        <p:spPr>
+          <a:xfrm>
+            <a:off x="6096000" y="5756505"/>
+            <a:ext cx="4744529" cy="461665"/>
+          </a:xfrm>
+          <a:prstGeom prst="rect">
+            <a:avLst/>
+          </a:prstGeom>
+        </p:spPr>
+        <p:style>
+          <a:lnRef idx="2">
+            <a:schemeClr val="accent5"/>
+          </a:lnRef>
+          <a:fillRef idx="1">
+            <a:schemeClr val="lt1"/>
+          </a:fillRef>
+          <a:effectRef idx="0">
+            <a:schemeClr val="accent5"/>
+          </a:effectRef>
+          <a:fontRef idx="minor">
+            <a:schemeClr val="dk1"/>
+          </a:fontRef>
+        </p:style>
+        <p:txBody>
+          <a:bodyPr wrap="square" rtlCol="1">
+            <a:spAutoFit/>
+          </a:bodyPr>
+          <a:lstStyle/>
+          <a:p>
+            <a:r>
+              <a:rPr lang="en-US" sz="2400" dirty="0"/>
+              <a:t>By some model of the environment</a:t>
+            </a:r>
+            <a:endParaRPr lang="he-IL" sz="2400" dirty="0"/>
+          </a:p>
+        </p:txBody>
+      </p:sp>
+      <p:cxnSp>
+        <p:nvCxnSpPr>
+          <p:cNvPr id="10" name="Straight Arrow Connector 9">
+            <a:extLst>
+              <a:ext uri="{FF2B5EF4-FFF2-40B4-BE49-F238E27FC236}">
+                <a16:creationId xmlns:a16="http://schemas.microsoft.com/office/drawing/2014/main" id="{0846581C-88A5-43B6-BF33-70D4F6DF8462}"/>
+              </a:ext>
+            </a:extLst>
+          </p:cNvPr>
+          <p:cNvCxnSpPr>
+            <a:cxnSpLocks/>
+          </p:cNvCxnSpPr>
+          <p:nvPr/>
+        </p:nvCxnSpPr>
+        <p:spPr>
+          <a:xfrm flipV="1">
+            <a:off x="2329132" y="3985404"/>
+            <a:ext cx="1578634" cy="1771101"/>
+          </a:xfrm>
+          <a:prstGeom prst="straightConnector1">
+            <a:avLst/>
+          </a:prstGeom>
+          <a:ln>
+            <a:tailEnd type="triangle"/>
+          </a:ln>
+        </p:spPr>
+        <p:style>
+          <a:lnRef idx="1">
+            <a:schemeClr val="accent1"/>
+          </a:lnRef>
+          <a:fillRef idx="0">
+            <a:schemeClr val="accent1"/>
+          </a:fillRef>
+          <a:effectRef idx="0">
+            <a:schemeClr val="accent1"/>
+          </a:effectRef>
+          <a:fontRef idx="minor">
+            <a:schemeClr val="tx1"/>
+          </a:fontRef>
+        </p:style>
+      </p:cxnSp>
+      <p:cxnSp>
+        <p:nvCxnSpPr>
+          <p:cNvPr id="13" name="Straight Arrow Connector 12">
+            <a:extLst>
+              <a:ext uri="{FF2B5EF4-FFF2-40B4-BE49-F238E27FC236}">
+                <a16:creationId xmlns:a16="http://schemas.microsoft.com/office/drawing/2014/main" id="{7D5FA493-D1C3-4184-969A-BF5FE115655D}"/>
+              </a:ext>
+            </a:extLst>
+          </p:cNvPr>
+          <p:cNvCxnSpPr>
+            <a:cxnSpLocks/>
+          </p:cNvCxnSpPr>
+          <p:nvPr/>
+        </p:nvCxnSpPr>
+        <p:spPr>
+          <a:xfrm flipH="1" flipV="1">
+            <a:off x="7203057" y="4537494"/>
+            <a:ext cx="835325" cy="1219011"/>
+          </a:xfrm>
+          <a:prstGeom prst="straightConnector1">
+            <a:avLst/>
+          </a:prstGeom>
+          <a:ln>
+            <a:tailEnd type="triangle"/>
+          </a:ln>
+        </p:spPr>
+        <p:style>
+          <a:lnRef idx="1">
+            <a:schemeClr val="accent1"/>
+          </a:lnRef>
+          <a:fillRef idx="0">
+            <a:schemeClr val="accent1"/>
+          </a:fillRef>
+          <a:effectRef idx="0">
+            <a:schemeClr val="accent1"/>
+          </a:effectRef>
+          <a:fontRef idx="minor">
+            <a:schemeClr val="tx1"/>
+          </a:fontRef>
+        </p:style>
+      </p:cxnSp>
     </p:spTree>
     <p:extLst>
       <p:ext uri="{BB962C8B-B14F-4D97-AF65-F5344CB8AC3E}">
         <p14:creationId xmlns:p14="http://schemas.microsoft.com/office/powerpoint/2010/main" val="301694965"/>
+      </p:ext>
+    </p:extLst>
+  </p:cSld>
+  <p:clrMapOvr>
+    <a:masterClrMapping/>
+  </p:clrMapOvr>
+</p:sld>
+</file>
+
+<file path=ppt/slides/slide2.xml><?xml version="1.0" encoding="utf-8"?>
+<p:sld xmlns:a="http://schemas.openxmlformats.org/drawingml/2006/main" xmlns:r="http://schemas.openxmlformats.org/officeDocument/2006/relationships" xmlns:p="http://schemas.openxmlformats.org/presentationml/2006/main">
+  <p:cSld>
+    <p:spTree>
+      <p:nvGrpSpPr>
+        <p:cNvPr id="1" name=""/>
+        <p:cNvGrpSpPr/>
+        <p:nvPr/>
+      </p:nvGrpSpPr>
+      <p:grpSpPr>
+        <a:xfrm>
+          <a:off x="0" y="0"/>
+          <a:ext cx="0" cy="0"/>
+          <a:chOff x="0" y="0"/>
+          <a:chExt cx="0" cy="0"/>
+        </a:xfrm>
+      </p:grpSpPr>
+      <p:sp>
+        <p:nvSpPr>
+          <p:cNvPr id="2" name="Title 1">
+            <a:extLst>
+              <a:ext uri="{FF2B5EF4-FFF2-40B4-BE49-F238E27FC236}">
+                <a16:creationId xmlns:a16="http://schemas.microsoft.com/office/drawing/2014/main" id="{9A7CE106-9DB3-4214-8ADF-9A8BD7B79E79}"/>
+              </a:ext>
+            </a:extLst>
+          </p:cNvPr>
+          <p:cNvSpPr>
+            <a:spLocks noGrp="1"/>
+          </p:cNvSpPr>
+          <p:nvPr>
+            <p:ph type="title"/>
+          </p:nvPr>
+        </p:nvSpPr>
+        <p:spPr/>
+        <p:txBody>
+          <a:bodyPr/>
+          <a:lstStyle/>
+          <a:p>
+            <a:r>
+              <a:rPr lang="en-US" dirty="0"/>
+              <a:t>Problems in our unique case</a:t>
+            </a:r>
+            <a:endParaRPr lang="he-IL" dirty="0"/>
+          </a:p>
+        </p:txBody>
+      </p:sp>
+      <mc:AlternateContent xmlns:mc="http://schemas.openxmlformats.org/markup-compatibility/2006" xmlns:a14="http://schemas.microsoft.com/office/drawing/2010/main">
+        <mc:Choice Requires="a14">
+          <p:sp>
+            <p:nvSpPr>
+              <p:cNvPr id="3" name="Content Placeholder 2">
+                <a:extLst>
+                  <a:ext uri="{FF2B5EF4-FFF2-40B4-BE49-F238E27FC236}">
+                    <a16:creationId xmlns:a16="http://schemas.microsoft.com/office/drawing/2014/main" id="{8D6C8707-EB5B-4815-B4E9-0DB856C4249B}"/>
+                  </a:ext>
+                </a:extLst>
+              </p:cNvPr>
+              <p:cNvSpPr>
+                <a:spLocks noGrp="1"/>
+              </p:cNvSpPr>
+              <p:nvPr>
+                <p:ph idx="1"/>
+              </p:nvPr>
+            </p:nvSpPr>
+            <p:spPr>
+              <a:xfrm>
+                <a:off x="493143" y="1808372"/>
+                <a:ext cx="10515600" cy="4351338"/>
+              </a:xfrm>
+            </p:spPr>
+            <p:txBody>
+              <a:bodyPr>
+                <a:normAutofit/>
+              </a:bodyPr>
+              <a:lstStyle/>
+              <a:p>
+                <a:r>
+                  <a:rPr lang="en-US" sz="2400" dirty="0"/>
+                  <a:t>The agents doesn’t have a </a:t>
+                </a:r>
+                <a:br>
+                  <a:rPr lang="en-US" sz="2400" dirty="0"/>
+                </a:br>
+                <a:r>
+                  <a:rPr lang="en-US" sz="2400" dirty="0"/>
+                  <a:t>model of the environment </a:t>
+                </a:r>
+                <a14:m>
+                  <m:oMath xmlns:m="http://schemas.openxmlformats.org/officeDocument/2006/math">
+                    <m:sSub>
+                      <m:sSubPr>
+                        <m:ctrlPr>
+                          <a:rPr lang="en-US" sz="2400" b="0" i="1" smtClean="0">
+                            <a:latin typeface="Cambria Math" panose="02040503050406030204" pitchFamily="18" charset="0"/>
+                          </a:rPr>
+                        </m:ctrlPr>
+                      </m:sSubPr>
+                      <m:e>
+                        <m:r>
+                          <a:rPr lang="en-US" sz="2400" b="0" i="1" smtClean="0">
+                            <a:latin typeface="Cambria Math" panose="02040503050406030204" pitchFamily="18" charset="0"/>
+                          </a:rPr>
+                          <m:t>𝑀</m:t>
+                        </m:r>
+                      </m:e>
+                      <m:sub>
+                        <m:r>
+                          <a:rPr lang="en-US" sz="2400" b="0" i="1" smtClean="0">
+                            <a:latin typeface="Cambria Math" panose="02040503050406030204" pitchFamily="18" charset="0"/>
+                          </a:rPr>
+                          <m:t>𝑣</m:t>
+                        </m:r>
+                      </m:sub>
+                    </m:sSub>
+                  </m:oMath>
+                </a14:m>
+                <a:r>
+                  <a:rPr lang="en-US" sz="2400" dirty="0"/>
+                  <a:t>.</a:t>
+                </a:r>
+              </a:p>
+              <a:p>
+                <a:pPr lvl="1"/>
+                <a:r>
+                  <a:rPr lang="en-US" sz="2000" dirty="0"/>
+                  <a:t>Can be learned online</a:t>
+                </a:r>
+              </a:p>
+              <a:p>
+                <a:r>
+                  <a:rPr lang="en-US" sz="2400" dirty="0"/>
+                  <a:t>An agent doesn’t know the </a:t>
+                </a:r>
+                <a:br>
+                  <a:rPr lang="en-US" sz="2400" dirty="0"/>
+                </a:br>
+                <a:r>
+                  <a:rPr lang="en-US" sz="2400" dirty="0"/>
+                  <a:t>action space of the other </a:t>
+                </a:r>
+                <a:br>
+                  <a:rPr lang="en-US" sz="2400" dirty="0"/>
+                </a:br>
+                <a:r>
+                  <a:rPr lang="en-US" sz="2400" dirty="0"/>
+                  <a:t>agents.</a:t>
+                </a:r>
+              </a:p>
+              <a:p>
+                <a:pPr lvl="1"/>
+                <a:r>
+                  <a:rPr lang="en-US" sz="2000" dirty="0"/>
+                  <a:t>We can’t grow a minimax tree</a:t>
+                </a:r>
+              </a:p>
+              <a:p>
+                <a:pPr lvl="1"/>
+                <a:r>
+                  <a:rPr lang="en-US" sz="2000" dirty="0"/>
+                  <a:t>We can: treat the other-agent </a:t>
+                </a:r>
+                <a:br>
+                  <a:rPr lang="en-US" sz="2000" dirty="0"/>
+                </a:br>
+                <a:r>
+                  <a:rPr lang="en-US" sz="2000" dirty="0"/>
+                  <a:t>node as hidden node somehow?</a:t>
+                </a:r>
+                <a:endParaRPr lang="he-IL" sz="2000" dirty="0"/>
+              </a:p>
+            </p:txBody>
+          </p:sp>
+        </mc:Choice>
+        <mc:Fallback xmlns="">
+          <p:sp>
+            <p:nvSpPr>
+              <p:cNvPr id="3" name="Content Placeholder 2">
+                <a:extLst>
+                  <a:ext uri="{FF2B5EF4-FFF2-40B4-BE49-F238E27FC236}">
+                    <a16:creationId xmlns:a16="http://schemas.microsoft.com/office/drawing/2014/main" id="{8D6C8707-EB5B-4815-B4E9-0DB856C4249B}"/>
+                  </a:ext>
+                </a:extLst>
+              </p:cNvPr>
+              <p:cNvSpPr>
+                <a:spLocks noGrp="1" noRot="1" noChangeAspect="1" noMove="1" noResize="1" noEditPoints="1" noAdjustHandles="1" noChangeArrowheads="1" noChangeShapeType="1" noTextEdit="1"/>
+              </p:cNvSpPr>
+              <p:nvPr>
+                <p:ph idx="1"/>
+              </p:nvPr>
+            </p:nvSpPr>
+            <p:spPr>
+              <a:xfrm>
+                <a:off x="493143" y="1808372"/>
+                <a:ext cx="10515600" cy="4351338"/>
+              </a:xfrm>
+              <a:blipFill>
+                <a:blip r:embed="rId4"/>
+                <a:stretch>
+                  <a:fillRect l="-812" t="-1964"/>
+                </a:stretch>
+              </a:blipFill>
+            </p:spPr>
+            <p:txBody>
+              <a:bodyPr/>
+              <a:lstStyle/>
+              <a:p>
+                <a:r>
+                  <a:rPr lang="he-IL">
+                    <a:noFill/>
+                  </a:rPr>
+                  <a:t> </a:t>
+                </a:r>
+              </a:p>
+            </p:txBody>
+          </p:sp>
+        </mc:Fallback>
+      </mc:AlternateContent>
+      <p:pic>
+        <p:nvPicPr>
+          <p:cNvPr id="5" name="Picture 4">
+            <a:extLst>
+              <a:ext uri="{FF2B5EF4-FFF2-40B4-BE49-F238E27FC236}">
+                <a16:creationId xmlns:a16="http://schemas.microsoft.com/office/drawing/2014/main" id="{46D3A88E-0ADE-4358-901C-1E4639A45F46}"/>
+              </a:ext>
+            </a:extLst>
+          </p:cNvPr>
+          <p:cNvPicPr>
+            <a:picLocks noChangeAspect="1"/>
+          </p:cNvPicPr>
+          <p:nvPr/>
+        </p:nvPicPr>
+        <p:blipFill>
+          <a:blip r:embed="rId5"/>
+          <a:stretch>
+            <a:fillRect/>
+          </a:stretch>
+        </p:blipFill>
+        <p:spPr>
+          <a:xfrm>
+            <a:off x="5106839" y="1594832"/>
+            <a:ext cx="7085162" cy="4948439"/>
+          </a:xfrm>
+          <a:prstGeom prst="rect">
+            <a:avLst/>
+          </a:prstGeom>
+          <a:ln w="38100" cap="sq">
+            <a:solidFill>
+              <a:srgbClr val="000000"/>
+            </a:solidFill>
+            <a:prstDash val="solid"/>
+            <a:miter lim="800000"/>
+          </a:ln>
+          <a:effectLst>
+            <a:outerShdw blurRad="50800" dist="38100" dir="2700000" algn="tl" rotWithShape="0">
+              <a:srgbClr val="000000">
+                <a:alpha val="43000"/>
+              </a:srgbClr>
+            </a:outerShdw>
+          </a:effectLst>
+        </p:spPr>
+      </p:pic>
+    </p:spTree>
+    <p:extLst>
+      <p:ext uri="{BB962C8B-B14F-4D97-AF65-F5344CB8AC3E}">
+        <p14:creationId xmlns:p14="http://schemas.microsoft.com/office/powerpoint/2010/main" val="393132663"/>
+      </p:ext>
+    </p:extLst>
+  </p:cSld>
+  <p:clrMapOvr>
+    <a:masterClrMapping/>
+  </p:clrMapOvr>
+</p:sld>
+</file>
+
+<file path=ppt/slides/slide3.xml><?xml version="1.0" encoding="utf-8"?>
+<p:sld xmlns:a="http://schemas.openxmlformats.org/drawingml/2006/main" xmlns:r="http://schemas.openxmlformats.org/officeDocument/2006/relationships" xmlns:p="http://schemas.openxmlformats.org/presentationml/2006/main">
+  <p:cSld>
+    <p:spTree>
+      <p:nvGrpSpPr>
+        <p:cNvPr id="1" name=""/>
+        <p:cNvGrpSpPr/>
+        <p:nvPr/>
+      </p:nvGrpSpPr>
+      <p:grpSpPr>
+        <a:xfrm>
+          <a:off x="0" y="0"/>
+          <a:ext cx="0" cy="0"/>
+          <a:chOff x="0" y="0"/>
+          <a:chExt cx="0" cy="0"/>
+        </a:xfrm>
+      </p:grpSpPr>
+      <p:sp>
+        <p:nvSpPr>
+          <p:cNvPr id="10" name="TextBox 9">
+            <a:extLst>
+              <a:ext uri="{FF2B5EF4-FFF2-40B4-BE49-F238E27FC236}">
+                <a16:creationId xmlns:a16="http://schemas.microsoft.com/office/drawing/2014/main" id="{1D3D1157-A66B-4C04-B89A-9C479E8027A6}"/>
+              </a:ext>
+            </a:extLst>
+          </p:cNvPr>
+          <p:cNvSpPr txBox="1"/>
+          <p:nvPr/>
+        </p:nvSpPr>
+        <p:spPr>
+          <a:xfrm>
+            <a:off x="639793" y="1647950"/>
+            <a:ext cx="10567358" cy="4401205"/>
+          </a:xfrm>
+          <a:prstGeom prst="rect">
+            <a:avLst/>
+          </a:prstGeom>
+          <a:noFill/>
+        </p:spPr>
+        <p:txBody>
+          <a:bodyPr wrap="square" rtlCol="1">
+            <a:spAutoFit/>
+          </a:bodyPr>
+          <a:lstStyle/>
+          <a:p>
+            <a:r>
+              <a:rPr lang="en-US" sz="2000" dirty="0"/>
+              <a:t>The basic MCTS agent is planning with the following policies:</a:t>
+            </a:r>
+          </a:p>
+          <a:p>
+            <a:pPr marL="285750" indent="-285750">
+              <a:buFont typeface="Arial" panose="020B0604020202020204" pitchFamily="34" charset="0"/>
+              <a:buChar char="•"/>
+            </a:pPr>
+            <a:r>
+              <a:rPr lang="en-US" sz="2000" u="sng" dirty="0"/>
+              <a:t>Tree policy</a:t>
+            </a:r>
+            <a:r>
+              <a:rPr lang="en-US" sz="2000" dirty="0"/>
+              <a:t>: UCT</a:t>
+            </a:r>
+          </a:p>
+          <a:p>
+            <a:pPr marL="285750" indent="-285750">
+              <a:buFont typeface="Arial" panose="020B0604020202020204" pitchFamily="34" charset="0"/>
+              <a:buChar char="•"/>
+            </a:pPr>
+            <a:r>
+              <a:rPr lang="en-US" sz="2000" u="sng" dirty="0"/>
+              <a:t>Roll-out policy</a:t>
+            </a:r>
+            <a:r>
+              <a:rPr lang="en-US" sz="2000" dirty="0"/>
+              <a:t>: Random moves</a:t>
+            </a:r>
+          </a:p>
+          <a:p>
+            <a:endParaRPr lang="en-US" sz="2000" dirty="0"/>
+          </a:p>
+          <a:p>
+            <a:r>
+              <a:rPr lang="en-US" sz="2000" dirty="0"/>
+              <a:t>Main parameters in the algorithm are:</a:t>
+            </a:r>
+          </a:p>
+          <a:p>
+            <a:pPr marL="285750" indent="-285750">
+              <a:buFont typeface="Arial" panose="020B0604020202020204" pitchFamily="34" charset="0"/>
+              <a:buChar char="•"/>
+            </a:pPr>
+            <a:r>
+              <a:rPr lang="en-US" sz="2000" dirty="0"/>
+              <a:t>Number of simulations</a:t>
+            </a:r>
+          </a:p>
+          <a:p>
+            <a:pPr marL="285750" indent="-285750">
+              <a:buFont typeface="Arial" panose="020B0604020202020204" pitchFamily="34" charset="0"/>
+              <a:buChar char="•"/>
+            </a:pPr>
+            <a:r>
+              <a:rPr lang="en-US" sz="2000" dirty="0"/>
+              <a:t>Simulations depth</a:t>
+            </a:r>
+          </a:p>
+          <a:p>
+            <a:pPr marL="285750" indent="-285750">
+              <a:buFont typeface="Arial" panose="020B0604020202020204" pitchFamily="34" charset="0"/>
+              <a:buChar char="•"/>
+            </a:pPr>
+            <a:r>
+              <a:rPr lang="en-US" sz="2000" dirty="0"/>
+              <a:t>Exploration constant</a:t>
+            </a:r>
+          </a:p>
+          <a:p>
+            <a:endParaRPr lang="en-US" sz="2000" dirty="0"/>
+          </a:p>
+          <a:p>
+            <a:r>
+              <a:rPr lang="en-US" sz="2000" dirty="0"/>
+              <a:t>After implementing the algorithm, I’ve evaluated the results over the following parameter-sets:</a:t>
+            </a:r>
+          </a:p>
+          <a:p>
+            <a:pPr marL="342900" indent="-342900">
+              <a:buFont typeface="Arial" panose="020B0604020202020204" pitchFamily="34" charset="0"/>
+              <a:buChar char="•"/>
+            </a:pPr>
+            <a:r>
+              <a:rPr lang="en-US" sz="2000" u="sng" dirty="0"/>
+              <a:t>Board size </a:t>
+            </a:r>
+            <a:r>
+              <a:rPr lang="en-US" sz="2000" dirty="0"/>
+              <a:t>(N*N) – 5,10,15</a:t>
+            </a:r>
+          </a:p>
+          <a:p>
+            <a:pPr marL="342900" indent="-342900">
+              <a:buFont typeface="Arial" panose="020B0604020202020204" pitchFamily="34" charset="0"/>
+              <a:buChar char="•"/>
+            </a:pPr>
+            <a:r>
+              <a:rPr lang="en-US" sz="2000" u="sng" dirty="0"/>
+              <a:t>Exploration constant</a:t>
+            </a:r>
+            <a:r>
+              <a:rPr lang="en-US" sz="2000" dirty="0"/>
+              <a:t>: 0.5, 0.75, 1, 1.25, 1.5, 1.75, 2</a:t>
+            </a:r>
+          </a:p>
+          <a:p>
+            <a:endParaRPr lang="en-US" sz="2000" dirty="0"/>
+          </a:p>
+          <a:p>
+            <a:r>
+              <a:rPr lang="en-US" sz="2000" dirty="0"/>
+              <a:t>*** The convergence achieved only when evaluating the MCTS agent as the </a:t>
+            </a:r>
+            <a:r>
+              <a:rPr lang="en-US" sz="2000" b="1" dirty="0"/>
+              <a:t>zombie agent</a:t>
+            </a:r>
+            <a:r>
+              <a:rPr lang="en-US" sz="2000" dirty="0"/>
+              <a:t>.</a:t>
+            </a:r>
+          </a:p>
+        </p:txBody>
+      </p:sp>
+      <p:sp>
+        <p:nvSpPr>
+          <p:cNvPr id="11" name="TextBox 10">
+            <a:extLst>
+              <a:ext uri="{FF2B5EF4-FFF2-40B4-BE49-F238E27FC236}">
+                <a16:creationId xmlns:a16="http://schemas.microsoft.com/office/drawing/2014/main" id="{6774F4B2-58E4-4211-A465-EC725E2C91B0}"/>
+              </a:ext>
+            </a:extLst>
+          </p:cNvPr>
+          <p:cNvSpPr txBox="1"/>
+          <p:nvPr/>
+        </p:nvSpPr>
+        <p:spPr>
+          <a:xfrm>
+            <a:off x="2725947" y="485679"/>
+            <a:ext cx="8255479" cy="646331"/>
+          </a:xfrm>
+          <a:prstGeom prst="rect">
+            <a:avLst/>
+          </a:prstGeom>
+          <a:noFill/>
+        </p:spPr>
+        <p:txBody>
+          <a:bodyPr wrap="square" rtlCol="1">
+            <a:spAutoFit/>
+          </a:bodyPr>
+          <a:lstStyle/>
+          <a:p>
+            <a:r>
+              <a:rPr lang="en-US" sz="3600" u="sng" dirty="0"/>
+              <a:t>Implementing MCTS - Summary</a:t>
+            </a:r>
+            <a:endParaRPr lang="he-IL" sz="3600" u="sng" dirty="0"/>
+          </a:p>
+        </p:txBody>
+      </p:sp>
+      <p:pic>
+        <p:nvPicPr>
+          <p:cNvPr id="14" name="Picture 13">
+            <a:extLst>
+              <a:ext uri="{FF2B5EF4-FFF2-40B4-BE49-F238E27FC236}">
+                <a16:creationId xmlns:a16="http://schemas.microsoft.com/office/drawing/2014/main" id="{B6763A5E-E250-4C24-90FD-C36D1B3A1F14}"/>
+              </a:ext>
+            </a:extLst>
+          </p:cNvPr>
+          <p:cNvPicPr>
+            <a:picLocks noChangeAspect="1"/>
+          </p:cNvPicPr>
+          <p:nvPr/>
+        </p:nvPicPr>
+        <p:blipFill>
+          <a:blip r:embed="rId2"/>
+          <a:stretch>
+            <a:fillRect/>
+          </a:stretch>
+        </p:blipFill>
+        <p:spPr>
+          <a:xfrm>
+            <a:off x="7907726" y="1647950"/>
+            <a:ext cx="2461224" cy="1306432"/>
+          </a:xfrm>
+          <a:prstGeom prst="rect">
+            <a:avLst/>
+          </a:prstGeom>
+        </p:spPr>
+      </p:pic>
+    </p:spTree>
+    <p:extLst>
+      <p:ext uri="{BB962C8B-B14F-4D97-AF65-F5344CB8AC3E}">
+        <p14:creationId xmlns:p14="http://schemas.microsoft.com/office/powerpoint/2010/main" val="1480871928"/>
+      </p:ext>
+    </p:extLst>
+  </p:cSld>
+  <p:clrMapOvr>
+    <a:masterClrMapping/>
+  </p:clrMapOvr>
+</p:sld>
+</file>
+
+<file path=ppt/slides/slide4.xml><?xml version="1.0" encoding="utf-8"?>
+<p:sld xmlns:a="http://schemas.openxmlformats.org/drawingml/2006/main" xmlns:r="http://schemas.openxmlformats.org/officeDocument/2006/relationships" xmlns:p="http://schemas.openxmlformats.org/presentationml/2006/main">
+  <p:cSld>
+    <p:spTree>
+      <p:nvGrpSpPr>
+        <p:cNvPr id="1" name=""/>
+        <p:cNvGrpSpPr/>
+        <p:nvPr/>
+      </p:nvGrpSpPr>
+      <p:grpSpPr>
+        <a:xfrm>
+          <a:off x="0" y="0"/>
+          <a:ext cx="0" cy="0"/>
+          <a:chOff x="0" y="0"/>
+          <a:chExt cx="0" cy="0"/>
+        </a:xfrm>
+      </p:grpSpPr>
+      <p:sp>
+        <p:nvSpPr>
+          <p:cNvPr id="2" name="Title 1">
+            <a:extLst>
+              <a:ext uri="{FF2B5EF4-FFF2-40B4-BE49-F238E27FC236}">
+                <a16:creationId xmlns:a16="http://schemas.microsoft.com/office/drawing/2014/main" id="{B2674287-0445-49B5-B335-00C70B4EB241}"/>
+              </a:ext>
+            </a:extLst>
+          </p:cNvPr>
+          <p:cNvSpPr>
+            <a:spLocks noGrp="1"/>
+          </p:cNvSpPr>
+          <p:nvPr>
+            <p:ph type="title"/>
+          </p:nvPr>
+        </p:nvSpPr>
+        <p:spPr>
+          <a:xfrm>
+            <a:off x="603849" y="207395"/>
+            <a:ext cx="10515600" cy="1325563"/>
+          </a:xfrm>
+        </p:spPr>
+        <p:txBody>
+          <a:bodyPr/>
+          <a:lstStyle/>
+          <a:p>
+            <a:r>
+              <a:rPr lang="en-US" dirty="0"/>
+              <a:t>Best results over the param-sets</a:t>
+            </a:r>
+            <a:endParaRPr lang="he-IL" dirty="0"/>
+          </a:p>
+        </p:txBody>
+      </p:sp>
+      <p:pic>
+        <p:nvPicPr>
+          <p:cNvPr id="5" name="Picture 4">
+            <a:extLst>
+              <a:ext uri="{FF2B5EF4-FFF2-40B4-BE49-F238E27FC236}">
+                <a16:creationId xmlns:a16="http://schemas.microsoft.com/office/drawing/2014/main" id="{57E65376-9187-4BE1-9726-BCC11ED99913}"/>
+              </a:ext>
+            </a:extLst>
+          </p:cNvPr>
+          <p:cNvPicPr>
+            <a:picLocks noChangeAspect="1"/>
+          </p:cNvPicPr>
+          <p:nvPr/>
+        </p:nvPicPr>
+        <p:blipFill>
+          <a:blip r:embed="rId2">
+            <a:extLst>
+              <a:ext uri="{28A0092B-C50C-407E-A947-70E740481C1C}">
+                <a14:useLocalDpi xmlns:a14="http://schemas.microsoft.com/office/drawing/2010/main" val="0"/>
+              </a:ext>
+            </a:extLst>
+          </a:blip>
+          <a:stretch>
+            <a:fillRect/>
+          </a:stretch>
+        </p:blipFill>
+        <p:spPr>
+          <a:xfrm>
+            <a:off x="4219755" y="1690688"/>
+            <a:ext cx="3230827" cy="2604207"/>
+          </a:xfrm>
+          <a:prstGeom prst="rect">
+            <a:avLst/>
+          </a:prstGeom>
+        </p:spPr>
+      </p:pic>
+      <p:sp>
+        <p:nvSpPr>
+          <p:cNvPr id="6" name="Title 1">
+            <a:extLst>
+              <a:ext uri="{FF2B5EF4-FFF2-40B4-BE49-F238E27FC236}">
+                <a16:creationId xmlns:a16="http://schemas.microsoft.com/office/drawing/2014/main" id="{AFEF6F07-A4EB-4761-8C45-94A4D1F3B94B}"/>
+              </a:ext>
+            </a:extLst>
+          </p:cNvPr>
+          <p:cNvSpPr txBox="1">
+            <a:spLocks/>
+          </p:cNvSpPr>
+          <p:nvPr/>
+        </p:nvSpPr>
+        <p:spPr>
+          <a:xfrm>
+            <a:off x="4219755" y="4429832"/>
+            <a:ext cx="3483634" cy="507563"/>
+          </a:xfrm>
+          <a:prstGeom prst="rect">
+            <a:avLst/>
+          </a:prstGeom>
+        </p:spPr>
+        <p:txBody>
+          <a:bodyPr vert="horz" lIns="91440" tIns="45720" rIns="91440" bIns="45720" rtlCol="0" anchor="ctr">
+            <a:normAutofit lnSpcReduction="10000"/>
+          </a:bodyPr>
+          <a:lstStyle>
+            <a:lvl1pPr algn="l" defTabSz="914400" rtl="0" eaLnBrk="1" latinLnBrk="0" hangingPunct="1">
+              <a:lnSpc>
+                <a:spcPct val="90000"/>
+              </a:lnSpc>
+              <a:spcBef>
+                <a:spcPct val="0"/>
+              </a:spcBef>
+              <a:buNone/>
+              <a:defRPr sz="4400" kern="1200">
+                <a:solidFill>
+                  <a:schemeClr val="tx1"/>
+                </a:solidFill>
+                <a:latin typeface="+mj-lt"/>
+                <a:ea typeface="+mj-ea"/>
+                <a:cs typeface="+mj-cs"/>
+              </a:defRPr>
+            </a:lvl1pPr>
+          </a:lstStyle>
+          <a:p>
+            <a:r>
+              <a:rPr lang="en-US" sz="1600" dirty="0"/>
+              <a:t>Board size: 10*10</a:t>
+            </a:r>
+          </a:p>
+          <a:p>
+            <a:r>
+              <a:rPr lang="en-US" sz="1600" dirty="0"/>
+              <a:t>Exploration rate: 1.5</a:t>
+            </a:r>
+            <a:endParaRPr lang="he-IL" sz="1600" dirty="0"/>
+          </a:p>
+        </p:txBody>
+      </p:sp>
+      <p:pic>
+        <p:nvPicPr>
+          <p:cNvPr id="12" name="Picture 11">
+            <a:extLst>
+              <a:ext uri="{FF2B5EF4-FFF2-40B4-BE49-F238E27FC236}">
+                <a16:creationId xmlns:a16="http://schemas.microsoft.com/office/drawing/2014/main" id="{5416CDD3-0AF6-4B77-9F77-566B627E7D83}"/>
+              </a:ext>
+            </a:extLst>
+          </p:cNvPr>
+          <p:cNvPicPr>
+            <a:picLocks noChangeAspect="1"/>
+          </p:cNvPicPr>
+          <p:nvPr/>
+        </p:nvPicPr>
+        <p:blipFill>
+          <a:blip r:embed="rId3">
+            <a:extLst>
+              <a:ext uri="{28A0092B-C50C-407E-A947-70E740481C1C}">
+                <a14:useLocalDpi xmlns:a14="http://schemas.microsoft.com/office/drawing/2010/main" val="0"/>
+              </a:ext>
+            </a:extLst>
+          </a:blip>
+          <a:stretch>
+            <a:fillRect/>
+          </a:stretch>
+        </p:blipFill>
+        <p:spPr>
+          <a:xfrm>
+            <a:off x="603849" y="1690688"/>
+            <a:ext cx="3230827" cy="2604208"/>
+          </a:xfrm>
+          <a:prstGeom prst="rect">
+            <a:avLst/>
+          </a:prstGeom>
+        </p:spPr>
+      </p:pic>
+      <p:sp>
+        <p:nvSpPr>
+          <p:cNvPr id="14" name="Title 1">
+            <a:extLst>
+              <a:ext uri="{FF2B5EF4-FFF2-40B4-BE49-F238E27FC236}">
+                <a16:creationId xmlns:a16="http://schemas.microsoft.com/office/drawing/2014/main" id="{68B027F1-C620-45D8-9EBE-8D52700DCE65}"/>
+              </a:ext>
+            </a:extLst>
+          </p:cNvPr>
+          <p:cNvSpPr txBox="1">
+            <a:spLocks/>
+          </p:cNvSpPr>
+          <p:nvPr/>
+        </p:nvSpPr>
+        <p:spPr>
+          <a:xfrm>
+            <a:off x="636198" y="4452625"/>
+            <a:ext cx="3483634" cy="507563"/>
+          </a:xfrm>
+          <a:prstGeom prst="rect">
+            <a:avLst/>
+          </a:prstGeom>
+        </p:spPr>
+        <p:txBody>
+          <a:bodyPr vert="horz" lIns="91440" tIns="45720" rIns="91440" bIns="45720" rtlCol="0" anchor="ctr">
+            <a:normAutofit lnSpcReduction="10000"/>
+          </a:bodyPr>
+          <a:lstStyle>
+            <a:lvl1pPr algn="l" defTabSz="914400" rtl="0" eaLnBrk="1" latinLnBrk="0" hangingPunct="1">
+              <a:lnSpc>
+                <a:spcPct val="90000"/>
+              </a:lnSpc>
+              <a:spcBef>
+                <a:spcPct val="0"/>
+              </a:spcBef>
+              <a:buNone/>
+              <a:defRPr sz="4400" kern="1200">
+                <a:solidFill>
+                  <a:schemeClr val="tx1"/>
+                </a:solidFill>
+                <a:latin typeface="+mj-lt"/>
+                <a:ea typeface="+mj-ea"/>
+                <a:cs typeface="+mj-cs"/>
+              </a:defRPr>
+            </a:lvl1pPr>
+          </a:lstStyle>
+          <a:p>
+            <a:r>
+              <a:rPr lang="en-US" sz="1600" dirty="0"/>
+              <a:t>Board size: 5*5</a:t>
+            </a:r>
+          </a:p>
+          <a:p>
+            <a:r>
+              <a:rPr lang="en-US" sz="1600" dirty="0"/>
+              <a:t>Exploration rate: 1.5</a:t>
+            </a:r>
+            <a:endParaRPr lang="he-IL" sz="1600" dirty="0"/>
+          </a:p>
+        </p:txBody>
+      </p:sp>
+      <p:pic>
+        <p:nvPicPr>
+          <p:cNvPr id="16" name="Picture 15">
+            <a:extLst>
+              <a:ext uri="{FF2B5EF4-FFF2-40B4-BE49-F238E27FC236}">
+                <a16:creationId xmlns:a16="http://schemas.microsoft.com/office/drawing/2014/main" id="{7FC9F27D-360D-4037-8755-4C152483306B}"/>
+              </a:ext>
+            </a:extLst>
+          </p:cNvPr>
+          <p:cNvPicPr>
+            <a:picLocks noChangeAspect="1"/>
+          </p:cNvPicPr>
+          <p:nvPr/>
+        </p:nvPicPr>
+        <p:blipFill>
+          <a:blip r:embed="rId4">
+            <a:extLst>
+              <a:ext uri="{28A0092B-C50C-407E-A947-70E740481C1C}">
+                <a14:useLocalDpi xmlns:a14="http://schemas.microsoft.com/office/drawing/2010/main" val="0"/>
+              </a:ext>
+            </a:extLst>
+          </a:blip>
+          <a:stretch>
+            <a:fillRect/>
+          </a:stretch>
+        </p:blipFill>
+        <p:spPr>
+          <a:xfrm>
+            <a:off x="7868632" y="1690687"/>
+            <a:ext cx="3230827" cy="2604207"/>
+          </a:xfrm>
+          <a:prstGeom prst="rect">
+            <a:avLst/>
+          </a:prstGeom>
+        </p:spPr>
+      </p:pic>
+      <p:sp>
+        <p:nvSpPr>
+          <p:cNvPr id="18" name="Title 1">
+            <a:extLst>
+              <a:ext uri="{FF2B5EF4-FFF2-40B4-BE49-F238E27FC236}">
+                <a16:creationId xmlns:a16="http://schemas.microsoft.com/office/drawing/2014/main" id="{D28D3243-5C27-4A85-96CA-CE4DA491B1FE}"/>
+              </a:ext>
+            </a:extLst>
+          </p:cNvPr>
+          <p:cNvSpPr txBox="1">
+            <a:spLocks/>
+          </p:cNvSpPr>
+          <p:nvPr/>
+        </p:nvSpPr>
+        <p:spPr>
+          <a:xfrm>
+            <a:off x="7868632" y="4469878"/>
+            <a:ext cx="3483634" cy="507563"/>
+          </a:xfrm>
+          <a:prstGeom prst="rect">
+            <a:avLst/>
+          </a:prstGeom>
+        </p:spPr>
+        <p:txBody>
+          <a:bodyPr vert="horz" lIns="91440" tIns="45720" rIns="91440" bIns="45720" rtlCol="0" anchor="ctr">
+            <a:normAutofit lnSpcReduction="10000"/>
+          </a:bodyPr>
+          <a:lstStyle>
+            <a:lvl1pPr algn="l" defTabSz="914400" rtl="0" eaLnBrk="1" latinLnBrk="0" hangingPunct="1">
+              <a:lnSpc>
+                <a:spcPct val="90000"/>
+              </a:lnSpc>
+              <a:spcBef>
+                <a:spcPct val="0"/>
+              </a:spcBef>
+              <a:buNone/>
+              <a:defRPr sz="4400" kern="1200">
+                <a:solidFill>
+                  <a:schemeClr val="tx1"/>
+                </a:solidFill>
+                <a:latin typeface="+mj-lt"/>
+                <a:ea typeface="+mj-ea"/>
+                <a:cs typeface="+mj-cs"/>
+              </a:defRPr>
+            </a:lvl1pPr>
+          </a:lstStyle>
+          <a:p>
+            <a:r>
+              <a:rPr lang="en-US" sz="1600" dirty="0"/>
+              <a:t>Board size: 15.*15</a:t>
+            </a:r>
+          </a:p>
+          <a:p>
+            <a:r>
+              <a:rPr lang="en-US" sz="1600" dirty="0"/>
+              <a:t>Exploration rate: 0.75</a:t>
+            </a:r>
+            <a:endParaRPr lang="he-IL" sz="1600" dirty="0"/>
+          </a:p>
+        </p:txBody>
+      </p:sp>
+      <p:sp>
+        <p:nvSpPr>
+          <p:cNvPr id="19" name="Title 1">
+            <a:extLst>
+              <a:ext uri="{FF2B5EF4-FFF2-40B4-BE49-F238E27FC236}">
+                <a16:creationId xmlns:a16="http://schemas.microsoft.com/office/drawing/2014/main" id="{55F40A00-82AD-4F3F-9316-A32FCF8974E1}"/>
+              </a:ext>
+            </a:extLst>
+          </p:cNvPr>
+          <p:cNvSpPr txBox="1">
+            <a:spLocks/>
+          </p:cNvSpPr>
+          <p:nvPr/>
+        </p:nvSpPr>
+        <p:spPr>
+          <a:xfrm>
+            <a:off x="603849" y="5167312"/>
+            <a:ext cx="10515600" cy="1325563"/>
+          </a:xfrm>
+          <a:prstGeom prst="rect">
+            <a:avLst/>
+          </a:prstGeom>
+        </p:spPr>
+        <p:txBody>
+          <a:bodyPr vert="horz" lIns="91440" tIns="45720" rIns="91440" bIns="45720" rtlCol="0" anchor="ctr">
+            <a:normAutofit lnSpcReduction="10000"/>
+          </a:bodyPr>
+          <a:lstStyle>
+            <a:lvl1pPr algn="l" defTabSz="914400" rtl="0" eaLnBrk="1" latinLnBrk="0" hangingPunct="1">
+              <a:lnSpc>
+                <a:spcPct val="90000"/>
+              </a:lnSpc>
+              <a:spcBef>
+                <a:spcPct val="0"/>
+              </a:spcBef>
+              <a:buNone/>
+              <a:defRPr sz="4400" kern="1200">
+                <a:solidFill>
+                  <a:schemeClr val="tx1"/>
+                </a:solidFill>
+                <a:latin typeface="+mj-lt"/>
+                <a:ea typeface="+mj-ea"/>
+                <a:cs typeface="+mj-cs"/>
+              </a:defRPr>
+            </a:lvl1pPr>
+          </a:lstStyle>
+          <a:p>
+            <a:r>
+              <a:rPr lang="en-US" sz="1800" dirty="0"/>
+              <a:t>Shared parameters:</a:t>
+            </a:r>
+          </a:p>
+          <a:p>
+            <a:pPr marL="285750" indent="-285750">
+              <a:buFont typeface="Arial" panose="020B0604020202020204" pitchFamily="34" charset="0"/>
+              <a:buChar char="•"/>
+            </a:pPr>
+            <a:r>
+              <a:rPr lang="en-US" sz="1800" dirty="0"/>
+              <a:t>Light size: 3</a:t>
+            </a:r>
+          </a:p>
+          <a:p>
+            <a:pPr marL="285750" indent="-285750">
+              <a:buFont typeface="Arial" panose="020B0604020202020204" pitchFamily="34" charset="0"/>
+              <a:buChar char="•"/>
+            </a:pPr>
+            <a:r>
+              <a:rPr lang="en-US" sz="1800" dirty="0"/>
+              <a:t>Zombies per episode (maximum reward): 10</a:t>
+            </a:r>
+          </a:p>
+          <a:p>
+            <a:pPr marL="285750" indent="-285750">
+              <a:buFont typeface="Arial" panose="020B0604020202020204" pitchFamily="34" charset="0"/>
+              <a:buChar char="•"/>
+            </a:pPr>
+            <a:r>
+              <a:rPr lang="en-US" sz="1800" dirty="0"/>
+              <a:t>Number of simulations: 25</a:t>
+            </a:r>
+          </a:p>
+          <a:p>
+            <a:pPr marL="285750" indent="-285750">
+              <a:buFont typeface="Arial" panose="020B0604020202020204" pitchFamily="34" charset="0"/>
+              <a:buChar char="•"/>
+            </a:pPr>
+            <a:r>
+              <a:rPr lang="en-US" sz="1800" dirty="0"/>
+              <a:t>Simulation depth: 5 nir@afeka.ac.il </a:t>
+            </a:r>
+          </a:p>
+          <a:p>
+            <a:pPr marL="285750" indent="-285750">
+              <a:buFont typeface="Arial" panose="020B0604020202020204" pitchFamily="34" charset="0"/>
+              <a:buChar char="•"/>
+            </a:pPr>
+            <a:endParaRPr lang="he-IL" sz="1800" dirty="0"/>
+          </a:p>
+        </p:txBody>
+      </p:sp>
+    </p:spTree>
+    <p:extLst>
+      <p:ext uri="{BB962C8B-B14F-4D97-AF65-F5344CB8AC3E}">
+        <p14:creationId xmlns:p14="http://schemas.microsoft.com/office/powerpoint/2010/main" val="2166869031"/>
       </p:ext>
     </p:extLst>
   </p:cSld>

</xml_diff>

<commit_message>
summary of results: 1. evaluation of mcts algorithm 2. mcts vs ddqn
</commit_message>
<xml_diff>
--- a/docs/mcts_thoughts.pptx
+++ b/docs/mcts_thoughts.pptx
@@ -9,6 +9,17 @@
     <p:sldId id="257" r:id="rId3"/>
     <p:sldId id="258" r:id="rId4"/>
     <p:sldId id="259" r:id="rId5"/>
+    <p:sldId id="264" r:id="rId6"/>
+    <p:sldId id="260" r:id="rId7"/>
+    <p:sldId id="261" r:id="rId8"/>
+    <p:sldId id="262" r:id="rId9"/>
+    <p:sldId id="263" r:id="rId10"/>
+    <p:sldId id="270" r:id="rId11"/>
+    <p:sldId id="265" r:id="rId12"/>
+    <p:sldId id="266" r:id="rId13"/>
+    <p:sldId id="267" r:id="rId14"/>
+    <p:sldId id="268" r:id="rId15"/>
+    <p:sldId id="271" r:id="rId16"/>
   </p:sldIdLst>
   <p:sldSz cx="12192000" cy="6858000"/>
   <p:notesSz cx="6858000" cy="9144000"/>
@@ -264,7 +275,7 @@
           <a:p>
             <a:fld id="{5EBA1020-A755-4E25-8AE7-0714D8187208}" type="datetimeFigureOut">
               <a:rPr lang="he-IL" smtClean="0"/>
-              <a:t>ג'/חשון/תשפ"א</a:t>
+              <a:t>כ"ד/חשון/תשפ"א</a:t>
             </a:fld>
             <a:endParaRPr lang="he-IL"/>
           </a:p>
@@ -464,7 +475,7 @@
           <a:p>
             <a:fld id="{5EBA1020-A755-4E25-8AE7-0714D8187208}" type="datetimeFigureOut">
               <a:rPr lang="he-IL" smtClean="0"/>
-              <a:t>ג'/חשון/תשפ"א</a:t>
+              <a:t>כ"ד/חשון/תשפ"א</a:t>
             </a:fld>
             <a:endParaRPr lang="he-IL"/>
           </a:p>
@@ -674,7 +685,7 @@
           <a:p>
             <a:fld id="{5EBA1020-A755-4E25-8AE7-0714D8187208}" type="datetimeFigureOut">
               <a:rPr lang="he-IL" smtClean="0"/>
-              <a:t>ג'/חשון/תשפ"א</a:t>
+              <a:t>כ"ד/חשון/תשפ"א</a:t>
             </a:fld>
             <a:endParaRPr lang="he-IL"/>
           </a:p>
@@ -874,7 +885,7 @@
           <a:p>
             <a:fld id="{5EBA1020-A755-4E25-8AE7-0714D8187208}" type="datetimeFigureOut">
               <a:rPr lang="he-IL" smtClean="0"/>
-              <a:t>ג'/חשון/תשפ"א</a:t>
+              <a:t>כ"ד/חשון/תשפ"א</a:t>
             </a:fld>
             <a:endParaRPr lang="he-IL"/>
           </a:p>
@@ -1150,7 +1161,7 @@
           <a:p>
             <a:fld id="{5EBA1020-A755-4E25-8AE7-0714D8187208}" type="datetimeFigureOut">
               <a:rPr lang="he-IL" smtClean="0"/>
-              <a:t>ג'/חשון/תשפ"א</a:t>
+              <a:t>כ"ד/חשון/תשפ"א</a:t>
             </a:fld>
             <a:endParaRPr lang="he-IL"/>
           </a:p>
@@ -1418,7 +1429,7 @@
           <a:p>
             <a:fld id="{5EBA1020-A755-4E25-8AE7-0714D8187208}" type="datetimeFigureOut">
               <a:rPr lang="he-IL" smtClean="0"/>
-              <a:t>ג'/חשון/תשפ"א</a:t>
+              <a:t>כ"ד/חשון/תשפ"א</a:t>
             </a:fld>
             <a:endParaRPr lang="he-IL"/>
           </a:p>
@@ -1833,7 +1844,7 @@
           <a:p>
             <a:fld id="{5EBA1020-A755-4E25-8AE7-0714D8187208}" type="datetimeFigureOut">
               <a:rPr lang="he-IL" smtClean="0"/>
-              <a:t>ג'/חשון/תשפ"א</a:t>
+              <a:t>כ"ד/חשון/תשפ"א</a:t>
             </a:fld>
             <a:endParaRPr lang="he-IL"/>
           </a:p>
@@ -1975,7 +1986,7 @@
           <a:p>
             <a:fld id="{5EBA1020-A755-4E25-8AE7-0714D8187208}" type="datetimeFigureOut">
               <a:rPr lang="he-IL" smtClean="0"/>
-              <a:t>ג'/חשון/תשפ"א</a:t>
+              <a:t>כ"ד/חשון/תשפ"א</a:t>
             </a:fld>
             <a:endParaRPr lang="he-IL"/>
           </a:p>
@@ -2088,7 +2099,7 @@
           <a:p>
             <a:fld id="{5EBA1020-A755-4E25-8AE7-0714D8187208}" type="datetimeFigureOut">
               <a:rPr lang="he-IL" smtClean="0"/>
-              <a:t>ג'/חשון/תשפ"א</a:t>
+              <a:t>כ"ד/חשון/תשפ"א</a:t>
             </a:fld>
             <a:endParaRPr lang="he-IL"/>
           </a:p>
@@ -2401,7 +2412,7 @@
           <a:p>
             <a:fld id="{5EBA1020-A755-4E25-8AE7-0714D8187208}" type="datetimeFigureOut">
               <a:rPr lang="he-IL" smtClean="0"/>
-              <a:t>ג'/חשון/תשפ"א</a:t>
+              <a:t>כ"ד/חשון/תשפ"א</a:t>
             </a:fld>
             <a:endParaRPr lang="he-IL"/>
           </a:p>
@@ -2690,7 +2701,7 @@
           <a:p>
             <a:fld id="{5EBA1020-A755-4E25-8AE7-0714D8187208}" type="datetimeFigureOut">
               <a:rPr lang="he-IL" smtClean="0"/>
-              <a:t>ג'/חשון/תשפ"א</a:t>
+              <a:t>כ"ד/חשון/תשפ"א</a:t>
             </a:fld>
             <a:endParaRPr lang="he-IL"/>
           </a:p>
@@ -2933,7 +2944,7 @@
           <a:p>
             <a:fld id="{5EBA1020-A755-4E25-8AE7-0714D8187208}" type="datetimeFigureOut">
               <a:rPr lang="he-IL" smtClean="0"/>
-              <a:t>ג'/חשון/תשפ"א</a:t>
+              <a:t>כ"ד/חשון/תשפ"א</a:t>
             </a:fld>
             <a:endParaRPr lang="he-IL"/>
           </a:p>
@@ -3626,6 +3637,521 @@
 </p:sld>
 </file>
 
+<file path=ppt/slides/slide10.xml><?xml version="1.0" encoding="utf-8"?>
+<p:sld xmlns:a="http://schemas.openxmlformats.org/drawingml/2006/main" xmlns:r="http://schemas.openxmlformats.org/officeDocument/2006/relationships" xmlns:p="http://schemas.openxmlformats.org/presentationml/2006/main">
+  <p:cSld>
+    <p:spTree>
+      <p:nvGrpSpPr>
+        <p:cNvPr id="1" name=""/>
+        <p:cNvGrpSpPr/>
+        <p:nvPr/>
+      </p:nvGrpSpPr>
+      <p:grpSpPr>
+        <a:xfrm>
+          <a:off x="0" y="0"/>
+          <a:ext cx="0" cy="0"/>
+          <a:chOff x="0" y="0"/>
+          <a:chExt cx="0" cy="0"/>
+        </a:xfrm>
+      </p:grpSpPr>
+      <p:sp>
+        <p:nvSpPr>
+          <p:cNvPr id="2" name="Title 1">
+            <a:extLst>
+              <a:ext uri="{FF2B5EF4-FFF2-40B4-BE49-F238E27FC236}">
+                <a16:creationId xmlns:a16="http://schemas.microsoft.com/office/drawing/2014/main" id="{412B2454-E5A7-4DFD-848C-2849CB023A88}"/>
+              </a:ext>
+            </a:extLst>
+          </p:cNvPr>
+          <p:cNvSpPr>
+            <a:spLocks noGrp="1"/>
+          </p:cNvSpPr>
+          <p:nvPr>
+            <p:ph type="title"/>
+          </p:nvPr>
+        </p:nvSpPr>
+        <p:spPr/>
+        <p:txBody>
+          <a:bodyPr/>
+          <a:lstStyle/>
+          <a:p>
+            <a:r>
+              <a:rPr lang="en-US" dirty="0"/>
+              <a:t>MCTS vs DDQN</a:t>
+            </a:r>
+            <a:endParaRPr lang="he-IL" dirty="0"/>
+          </a:p>
+        </p:txBody>
+      </p:sp>
+    </p:spTree>
+    <p:extLst>
+      <p:ext uri="{BB962C8B-B14F-4D97-AF65-F5344CB8AC3E}">
+        <p14:creationId xmlns:p14="http://schemas.microsoft.com/office/powerpoint/2010/main" val="1624175524"/>
+      </p:ext>
+    </p:extLst>
+  </p:cSld>
+  <p:clrMapOvr>
+    <a:masterClrMapping/>
+  </p:clrMapOvr>
+</p:sld>
+</file>
+
+<file path=ppt/slides/slide11.xml><?xml version="1.0" encoding="utf-8"?>
+<p:sld xmlns:a="http://schemas.openxmlformats.org/drawingml/2006/main" xmlns:r="http://schemas.openxmlformats.org/officeDocument/2006/relationships" xmlns:p="http://schemas.openxmlformats.org/presentationml/2006/main">
+  <p:cSld>
+    <p:spTree>
+      <p:nvGrpSpPr>
+        <p:cNvPr id="1" name=""/>
+        <p:cNvGrpSpPr/>
+        <p:nvPr/>
+      </p:nvGrpSpPr>
+      <p:grpSpPr>
+        <a:xfrm>
+          <a:off x="0" y="0"/>
+          <a:ext cx="0" cy="0"/>
+          <a:chOff x="0" y="0"/>
+          <a:chExt cx="0" cy="0"/>
+        </a:xfrm>
+      </p:grpSpPr>
+      <p:sp>
+        <p:nvSpPr>
+          <p:cNvPr id="2" name="Title 1">
+            <a:extLst>
+              <a:ext uri="{FF2B5EF4-FFF2-40B4-BE49-F238E27FC236}">
+                <a16:creationId xmlns:a16="http://schemas.microsoft.com/office/drawing/2014/main" id="{D81BCCC9-87A2-4507-B61F-6841D2BE9468}"/>
+              </a:ext>
+            </a:extLst>
+          </p:cNvPr>
+          <p:cNvSpPr>
+            <a:spLocks noGrp="1"/>
+          </p:cNvSpPr>
+          <p:nvPr>
+            <p:ph type="title"/>
+          </p:nvPr>
+        </p:nvSpPr>
+        <p:spPr/>
+        <p:txBody>
+          <a:bodyPr/>
+          <a:lstStyle/>
+          <a:p>
+            <a:r>
+              <a:rPr lang="en-US" dirty="0"/>
+              <a:t>MCTS vs DDQN – Board size of 2x1</a:t>
+            </a:r>
+            <a:endParaRPr lang="he-IL" dirty="0"/>
+          </a:p>
+        </p:txBody>
+      </p:sp>
+      <p:pic>
+        <p:nvPicPr>
+          <p:cNvPr id="4" name="Picture 3">
+            <a:extLst>
+              <a:ext uri="{FF2B5EF4-FFF2-40B4-BE49-F238E27FC236}">
+                <a16:creationId xmlns:a16="http://schemas.microsoft.com/office/drawing/2014/main" id="{31FA48FB-17F2-42FD-8D9D-2A39A119DF64}"/>
+              </a:ext>
+            </a:extLst>
+          </p:cNvPr>
+          <p:cNvPicPr>
+            <a:picLocks noChangeAspect="1"/>
+          </p:cNvPicPr>
+          <p:nvPr/>
+        </p:nvPicPr>
+        <p:blipFill>
+          <a:blip r:embed="rId2"/>
+          <a:stretch>
+            <a:fillRect/>
+          </a:stretch>
+        </p:blipFill>
+        <p:spPr>
+          <a:xfrm>
+            <a:off x="64283" y="1440522"/>
+            <a:ext cx="12127717" cy="4244286"/>
+          </a:xfrm>
+          <a:prstGeom prst="rect">
+            <a:avLst/>
+          </a:prstGeom>
+        </p:spPr>
+      </p:pic>
+    </p:spTree>
+    <p:extLst>
+      <p:ext uri="{BB962C8B-B14F-4D97-AF65-F5344CB8AC3E}">
+        <p14:creationId xmlns:p14="http://schemas.microsoft.com/office/powerpoint/2010/main" val="2843715805"/>
+      </p:ext>
+    </p:extLst>
+  </p:cSld>
+  <p:clrMapOvr>
+    <a:masterClrMapping/>
+  </p:clrMapOvr>
+</p:sld>
+</file>
+
+<file path=ppt/slides/slide12.xml><?xml version="1.0" encoding="utf-8"?>
+<p:sld xmlns:a="http://schemas.openxmlformats.org/drawingml/2006/main" xmlns:r="http://schemas.openxmlformats.org/officeDocument/2006/relationships" xmlns:p="http://schemas.openxmlformats.org/presentationml/2006/main">
+  <p:cSld>
+    <p:spTree>
+      <p:nvGrpSpPr>
+        <p:cNvPr id="1" name=""/>
+        <p:cNvGrpSpPr/>
+        <p:nvPr/>
+      </p:nvGrpSpPr>
+      <p:grpSpPr>
+        <a:xfrm>
+          <a:off x="0" y="0"/>
+          <a:ext cx="0" cy="0"/>
+          <a:chOff x="0" y="0"/>
+          <a:chExt cx="0" cy="0"/>
+        </a:xfrm>
+      </p:grpSpPr>
+      <p:sp>
+        <p:nvSpPr>
+          <p:cNvPr id="2" name="Title 1">
+            <a:extLst>
+              <a:ext uri="{FF2B5EF4-FFF2-40B4-BE49-F238E27FC236}">
+                <a16:creationId xmlns:a16="http://schemas.microsoft.com/office/drawing/2014/main" id="{D81BCCC9-87A2-4507-B61F-6841D2BE9468}"/>
+              </a:ext>
+            </a:extLst>
+          </p:cNvPr>
+          <p:cNvSpPr>
+            <a:spLocks noGrp="1"/>
+          </p:cNvSpPr>
+          <p:nvPr>
+            <p:ph type="title"/>
+          </p:nvPr>
+        </p:nvSpPr>
+        <p:spPr/>
+        <p:txBody>
+          <a:bodyPr/>
+          <a:lstStyle/>
+          <a:p>
+            <a:r>
+              <a:rPr lang="en-US" dirty="0"/>
+              <a:t>MCTS vs DDQN– Board size of 4x2</a:t>
+            </a:r>
+            <a:endParaRPr lang="he-IL" dirty="0"/>
+          </a:p>
+        </p:txBody>
+      </p:sp>
+      <p:pic>
+        <p:nvPicPr>
+          <p:cNvPr id="5" name="Picture 4">
+            <a:extLst>
+              <a:ext uri="{FF2B5EF4-FFF2-40B4-BE49-F238E27FC236}">
+                <a16:creationId xmlns:a16="http://schemas.microsoft.com/office/drawing/2014/main" id="{B659CB7C-7B11-4E7F-8E5C-86A12F140F1E}"/>
+              </a:ext>
+            </a:extLst>
+          </p:cNvPr>
+          <p:cNvPicPr>
+            <a:picLocks noChangeAspect="1"/>
+          </p:cNvPicPr>
+          <p:nvPr/>
+        </p:nvPicPr>
+        <p:blipFill>
+          <a:blip r:embed="rId2"/>
+          <a:stretch>
+            <a:fillRect/>
+          </a:stretch>
+        </p:blipFill>
+        <p:spPr>
+          <a:xfrm>
+            <a:off x="0" y="1513318"/>
+            <a:ext cx="12192000" cy="4245429"/>
+          </a:xfrm>
+          <a:prstGeom prst="rect">
+            <a:avLst/>
+          </a:prstGeom>
+        </p:spPr>
+      </p:pic>
+    </p:spTree>
+    <p:extLst>
+      <p:ext uri="{BB962C8B-B14F-4D97-AF65-F5344CB8AC3E}">
+        <p14:creationId xmlns:p14="http://schemas.microsoft.com/office/powerpoint/2010/main" val="1271260266"/>
+      </p:ext>
+    </p:extLst>
+  </p:cSld>
+  <p:clrMapOvr>
+    <a:masterClrMapping/>
+  </p:clrMapOvr>
+</p:sld>
+</file>
+
+<file path=ppt/slides/slide13.xml><?xml version="1.0" encoding="utf-8"?>
+<p:sld xmlns:a="http://schemas.openxmlformats.org/drawingml/2006/main" xmlns:r="http://schemas.openxmlformats.org/officeDocument/2006/relationships" xmlns:p="http://schemas.openxmlformats.org/presentationml/2006/main">
+  <p:cSld>
+    <p:spTree>
+      <p:nvGrpSpPr>
+        <p:cNvPr id="1" name=""/>
+        <p:cNvGrpSpPr/>
+        <p:nvPr/>
+      </p:nvGrpSpPr>
+      <p:grpSpPr>
+        <a:xfrm>
+          <a:off x="0" y="0"/>
+          <a:ext cx="0" cy="0"/>
+          <a:chOff x="0" y="0"/>
+          <a:chExt cx="0" cy="0"/>
+        </a:xfrm>
+      </p:grpSpPr>
+      <p:sp>
+        <p:nvSpPr>
+          <p:cNvPr id="2" name="Title 1">
+            <a:extLst>
+              <a:ext uri="{FF2B5EF4-FFF2-40B4-BE49-F238E27FC236}">
+                <a16:creationId xmlns:a16="http://schemas.microsoft.com/office/drawing/2014/main" id="{D81BCCC9-87A2-4507-B61F-6841D2BE9468}"/>
+              </a:ext>
+            </a:extLst>
+          </p:cNvPr>
+          <p:cNvSpPr>
+            <a:spLocks noGrp="1"/>
+          </p:cNvSpPr>
+          <p:nvPr>
+            <p:ph type="title"/>
+          </p:nvPr>
+        </p:nvSpPr>
+        <p:spPr/>
+        <p:txBody>
+          <a:bodyPr/>
+          <a:lstStyle/>
+          <a:p>
+            <a:r>
+              <a:rPr lang="en-US" dirty="0"/>
+              <a:t>MCTS vs DDQN– Board size of 6x3</a:t>
+            </a:r>
+            <a:endParaRPr lang="he-IL" dirty="0"/>
+          </a:p>
+        </p:txBody>
+      </p:sp>
+      <p:pic>
+        <p:nvPicPr>
+          <p:cNvPr id="5" name="Picture 4">
+            <a:extLst>
+              <a:ext uri="{FF2B5EF4-FFF2-40B4-BE49-F238E27FC236}">
+                <a16:creationId xmlns:a16="http://schemas.microsoft.com/office/drawing/2014/main" id="{77D823D6-0810-492C-AD81-35067AF7D1C2}"/>
+              </a:ext>
+            </a:extLst>
+          </p:cNvPr>
+          <p:cNvPicPr>
+            <a:picLocks noChangeAspect="1"/>
+          </p:cNvPicPr>
+          <p:nvPr/>
+        </p:nvPicPr>
+        <p:blipFill>
+          <a:blip r:embed="rId2"/>
+          <a:stretch>
+            <a:fillRect/>
+          </a:stretch>
+        </p:blipFill>
+        <p:spPr>
+          <a:xfrm>
+            <a:off x="0" y="1469183"/>
+            <a:ext cx="12192000" cy="4264691"/>
+          </a:xfrm>
+          <a:prstGeom prst="rect">
+            <a:avLst/>
+          </a:prstGeom>
+        </p:spPr>
+      </p:pic>
+    </p:spTree>
+    <p:extLst>
+      <p:ext uri="{BB962C8B-B14F-4D97-AF65-F5344CB8AC3E}">
+        <p14:creationId xmlns:p14="http://schemas.microsoft.com/office/powerpoint/2010/main" val="1566256252"/>
+      </p:ext>
+    </p:extLst>
+  </p:cSld>
+  <p:clrMapOvr>
+    <a:masterClrMapping/>
+  </p:clrMapOvr>
+</p:sld>
+</file>
+
+<file path=ppt/slides/slide14.xml><?xml version="1.0" encoding="utf-8"?>
+<p:sld xmlns:a="http://schemas.openxmlformats.org/drawingml/2006/main" xmlns:r="http://schemas.openxmlformats.org/officeDocument/2006/relationships" xmlns:p="http://schemas.openxmlformats.org/presentationml/2006/main">
+  <p:cSld>
+    <p:spTree>
+      <p:nvGrpSpPr>
+        <p:cNvPr id="1" name=""/>
+        <p:cNvGrpSpPr/>
+        <p:nvPr/>
+      </p:nvGrpSpPr>
+      <p:grpSpPr>
+        <a:xfrm>
+          <a:off x="0" y="0"/>
+          <a:ext cx="0" cy="0"/>
+          <a:chOff x="0" y="0"/>
+          <a:chExt cx="0" cy="0"/>
+        </a:xfrm>
+      </p:grpSpPr>
+      <p:sp>
+        <p:nvSpPr>
+          <p:cNvPr id="2" name="Title 1">
+            <a:extLst>
+              <a:ext uri="{FF2B5EF4-FFF2-40B4-BE49-F238E27FC236}">
+                <a16:creationId xmlns:a16="http://schemas.microsoft.com/office/drawing/2014/main" id="{D81BCCC9-87A2-4507-B61F-6841D2BE9468}"/>
+              </a:ext>
+            </a:extLst>
+          </p:cNvPr>
+          <p:cNvSpPr>
+            <a:spLocks noGrp="1"/>
+          </p:cNvSpPr>
+          <p:nvPr>
+            <p:ph type="title"/>
+          </p:nvPr>
+        </p:nvSpPr>
+        <p:spPr/>
+        <p:txBody>
+          <a:bodyPr/>
+          <a:lstStyle/>
+          <a:p>
+            <a:r>
+              <a:rPr lang="en-US" dirty="0"/>
+              <a:t>MCTS vs DDQN– Board size of 8x4</a:t>
+            </a:r>
+            <a:endParaRPr lang="he-IL" dirty="0"/>
+          </a:p>
+        </p:txBody>
+      </p:sp>
+      <p:pic>
+        <p:nvPicPr>
+          <p:cNvPr id="5" name="Picture 4">
+            <a:extLst>
+              <a:ext uri="{FF2B5EF4-FFF2-40B4-BE49-F238E27FC236}">
+                <a16:creationId xmlns:a16="http://schemas.microsoft.com/office/drawing/2014/main" id="{AD1D93FC-666F-4566-A7FD-46C65A9FAB52}"/>
+              </a:ext>
+            </a:extLst>
+          </p:cNvPr>
+          <p:cNvPicPr>
+            <a:picLocks noChangeAspect="1"/>
+          </p:cNvPicPr>
+          <p:nvPr/>
+        </p:nvPicPr>
+        <p:blipFill>
+          <a:blip r:embed="rId2"/>
+          <a:stretch>
+            <a:fillRect/>
+          </a:stretch>
+        </p:blipFill>
+        <p:spPr>
+          <a:xfrm>
+            <a:off x="0" y="1610723"/>
+            <a:ext cx="12192000" cy="4257656"/>
+          </a:xfrm>
+          <a:prstGeom prst="rect">
+            <a:avLst/>
+          </a:prstGeom>
+        </p:spPr>
+      </p:pic>
+    </p:spTree>
+    <p:extLst>
+      <p:ext uri="{BB962C8B-B14F-4D97-AF65-F5344CB8AC3E}">
+        <p14:creationId xmlns:p14="http://schemas.microsoft.com/office/powerpoint/2010/main" val="2156286051"/>
+      </p:ext>
+    </p:extLst>
+  </p:cSld>
+  <p:clrMapOvr>
+    <a:masterClrMapping/>
+  </p:clrMapOvr>
+</p:sld>
+</file>
+
+<file path=ppt/slides/slide15.xml><?xml version="1.0" encoding="utf-8"?>
+<p:sld xmlns:a="http://schemas.openxmlformats.org/drawingml/2006/main" xmlns:r="http://schemas.openxmlformats.org/officeDocument/2006/relationships" xmlns:p="http://schemas.openxmlformats.org/presentationml/2006/main">
+  <p:cSld>
+    <p:spTree>
+      <p:nvGrpSpPr>
+        <p:cNvPr id="1" name=""/>
+        <p:cNvGrpSpPr/>
+        <p:nvPr/>
+      </p:nvGrpSpPr>
+      <p:grpSpPr>
+        <a:xfrm>
+          <a:off x="0" y="0"/>
+          <a:ext cx="0" cy="0"/>
+          <a:chOff x="0" y="0"/>
+          <a:chExt cx="0" cy="0"/>
+        </a:xfrm>
+      </p:grpSpPr>
+      <p:sp>
+        <p:nvSpPr>
+          <p:cNvPr id="2" name="Title 1">
+            <a:extLst>
+              <a:ext uri="{FF2B5EF4-FFF2-40B4-BE49-F238E27FC236}">
+                <a16:creationId xmlns:a16="http://schemas.microsoft.com/office/drawing/2014/main" id="{86508AAE-6EC1-4D4F-9086-F6A2F1F8B3BA}"/>
+              </a:ext>
+            </a:extLst>
+          </p:cNvPr>
+          <p:cNvSpPr>
+            <a:spLocks noGrp="1"/>
+          </p:cNvSpPr>
+          <p:nvPr>
+            <p:ph type="title"/>
+          </p:nvPr>
+        </p:nvSpPr>
+        <p:spPr/>
+        <p:txBody>
+          <a:bodyPr/>
+          <a:lstStyle/>
+          <a:p>
+            <a:r>
+              <a:rPr lang="en-US" dirty="0"/>
+              <a:t>Focusing light action space</a:t>
+            </a:r>
+            <a:endParaRPr lang="he-IL" dirty="0"/>
+          </a:p>
+        </p:txBody>
+      </p:sp>
+      <p:sp>
+        <p:nvSpPr>
+          <p:cNvPr id="3" name="Content Placeholder 2">
+            <a:extLst>
+              <a:ext uri="{FF2B5EF4-FFF2-40B4-BE49-F238E27FC236}">
+                <a16:creationId xmlns:a16="http://schemas.microsoft.com/office/drawing/2014/main" id="{2D954CA9-F64A-4B4B-8CF1-36B63B5930E8}"/>
+              </a:ext>
+            </a:extLst>
+          </p:cNvPr>
+          <p:cNvSpPr>
+            <a:spLocks noGrp="1"/>
+          </p:cNvSpPr>
+          <p:nvPr>
+            <p:ph idx="1"/>
+          </p:nvPr>
+        </p:nvSpPr>
+        <p:spPr/>
+        <p:txBody>
+          <a:bodyPr/>
+          <a:lstStyle/>
+          <a:p>
+            <a:r>
+              <a:rPr lang="en-US" dirty="0"/>
+              <a:t>I’ve noticed that sometimes the light agent decides to place the light without hitting any zombies.</a:t>
+            </a:r>
+          </a:p>
+          <a:p>
+            <a:r>
+              <a:rPr lang="en-US" dirty="0"/>
+              <a:t>Although the light master knows where all the zombie at</a:t>
+            </a:r>
+          </a:p>
+          <a:p>
+            <a:r>
+              <a:rPr lang="en-US" dirty="0"/>
+              <a:t>Maybe we should constraint the light master to pick only the actions that include at least one zombie? </a:t>
+            </a:r>
+            <a:endParaRPr lang="he-IL" dirty="0"/>
+          </a:p>
+        </p:txBody>
+      </p:sp>
+    </p:spTree>
+    <p:extLst>
+      <p:ext uri="{BB962C8B-B14F-4D97-AF65-F5344CB8AC3E}">
+        <p14:creationId xmlns:p14="http://schemas.microsoft.com/office/powerpoint/2010/main" val="4209842814"/>
+      </p:ext>
+    </p:extLst>
+  </p:cSld>
+  <p:clrMapOvr>
+    <a:masterClrMapping/>
+  </p:clrMapOvr>
+</p:sld>
+</file>
+
 <file path=ppt/slides/slide2.xml><?xml version="1.0" encoding="utf-8"?>
 <p:sld xmlns:a="http://schemas.openxmlformats.org/drawingml/2006/main" xmlns:r="http://schemas.openxmlformats.org/officeDocument/2006/relationships" xmlns:p="http://schemas.openxmlformats.org/presentationml/2006/main">
   <p:cSld>
@@ -4599,6 +5125,1015 @@
     <p:extLst>
       <p:ext uri="{BB962C8B-B14F-4D97-AF65-F5344CB8AC3E}">
         <p14:creationId xmlns:p14="http://schemas.microsoft.com/office/powerpoint/2010/main" val="2166869031"/>
+      </p:ext>
+    </p:extLst>
+  </p:cSld>
+  <p:clrMapOvr>
+    <a:masterClrMapping/>
+  </p:clrMapOvr>
+</p:sld>
+</file>
+
+<file path=ppt/slides/slide5.xml><?xml version="1.0" encoding="utf-8"?>
+<p:sld xmlns:a="http://schemas.openxmlformats.org/drawingml/2006/main" xmlns:r="http://schemas.openxmlformats.org/officeDocument/2006/relationships" xmlns:p="http://schemas.openxmlformats.org/presentationml/2006/main">
+  <p:cSld>
+    <p:spTree>
+      <p:nvGrpSpPr>
+        <p:cNvPr id="1" name=""/>
+        <p:cNvGrpSpPr/>
+        <p:nvPr/>
+      </p:nvGrpSpPr>
+      <p:grpSpPr>
+        <a:xfrm>
+          <a:off x="0" y="0"/>
+          <a:ext cx="0" cy="0"/>
+          <a:chOff x="0" y="0"/>
+          <a:chExt cx="0" cy="0"/>
+        </a:xfrm>
+      </p:grpSpPr>
+      <p:sp>
+        <p:nvSpPr>
+          <p:cNvPr id="2" name="Title 1">
+            <a:extLst>
+              <a:ext uri="{FF2B5EF4-FFF2-40B4-BE49-F238E27FC236}">
+                <a16:creationId xmlns:a16="http://schemas.microsoft.com/office/drawing/2014/main" id="{412B2454-E5A7-4DFD-848C-2849CB023A88}"/>
+              </a:ext>
+            </a:extLst>
+          </p:cNvPr>
+          <p:cNvSpPr>
+            <a:spLocks noGrp="1"/>
+          </p:cNvSpPr>
+          <p:nvPr>
+            <p:ph type="title"/>
+          </p:nvPr>
+        </p:nvSpPr>
+        <p:spPr/>
+        <p:txBody>
+          <a:bodyPr/>
+          <a:lstStyle/>
+          <a:p>
+            <a:r>
+              <a:rPr lang="en-US" dirty="0"/>
+              <a:t>MCTS evaluation</a:t>
+            </a:r>
+            <a:endParaRPr lang="he-IL" dirty="0"/>
+          </a:p>
+        </p:txBody>
+      </p:sp>
+      <p:sp>
+        <p:nvSpPr>
+          <p:cNvPr id="3" name="Content Placeholder 2">
+            <a:extLst>
+              <a:ext uri="{FF2B5EF4-FFF2-40B4-BE49-F238E27FC236}">
+                <a16:creationId xmlns:a16="http://schemas.microsoft.com/office/drawing/2014/main" id="{1C439A6F-CF59-4694-BFBF-786E374ED02A}"/>
+              </a:ext>
+            </a:extLst>
+          </p:cNvPr>
+          <p:cNvSpPr>
+            <a:spLocks noGrp="1"/>
+          </p:cNvSpPr>
+          <p:nvPr>
+            <p:ph idx="1"/>
+          </p:nvPr>
+        </p:nvSpPr>
+        <p:spPr/>
+        <p:txBody>
+          <a:bodyPr/>
+          <a:lstStyle/>
+          <a:p>
+            <a:r>
+              <a:rPr lang="en-US" dirty="0"/>
+              <a:t>Evaluation process of the MCTS algorithm:</a:t>
+            </a:r>
+          </a:p>
+          <a:p>
+            <a:pPr lvl="1"/>
+            <a:r>
+              <a:rPr lang="en-US" dirty="0"/>
+              <a:t>Board sizes: 2x1 ; 4x2 ; 6x3 ; 8x4</a:t>
+            </a:r>
+          </a:p>
+          <a:p>
+            <a:pPr lvl="1"/>
+            <a:r>
+              <a:rPr lang="en-US" dirty="0"/>
+              <a:t>Light sizes: 1 ; 2 ; 3 ; 4</a:t>
+            </a:r>
+          </a:p>
+          <a:p>
+            <a:pPr lvl="1"/>
+            <a:r>
+              <a:rPr lang="en-US" dirty="0"/>
+              <a:t>Exploration rate 0 , 0.2 , 0.4 … 3.8 , 4</a:t>
+            </a:r>
+          </a:p>
+          <a:p>
+            <a:pPr lvl="1"/>
+            <a:endParaRPr lang="he-IL" dirty="0"/>
+          </a:p>
+        </p:txBody>
+      </p:sp>
+      <p:graphicFrame>
+        <p:nvGraphicFramePr>
+          <p:cNvPr id="4" name="Table 4">
+            <a:extLst>
+              <a:ext uri="{FF2B5EF4-FFF2-40B4-BE49-F238E27FC236}">
+                <a16:creationId xmlns:a16="http://schemas.microsoft.com/office/drawing/2014/main" id="{676931E4-1299-4CA6-94BC-3EF32A10EE86}"/>
+              </a:ext>
+            </a:extLst>
+          </p:cNvPr>
+          <p:cNvGraphicFramePr>
+            <a:graphicFrameLocks noGrp="1"/>
+          </p:cNvGraphicFramePr>
+          <p:nvPr>
+            <p:extLst>
+              <p:ext uri="{D42A27DB-BD31-4B8C-83A1-F6EECF244321}">
+                <p14:modId xmlns:p14="http://schemas.microsoft.com/office/powerpoint/2010/main" val="2119440654"/>
+              </p:ext>
+            </p:extLst>
+          </p:nvPr>
+        </p:nvGraphicFramePr>
+        <p:xfrm>
+          <a:off x="3484329" y="3575649"/>
+          <a:ext cx="5223341" cy="1854200"/>
+        </p:xfrm>
+        <a:graphic>
+          <a:graphicData uri="http://schemas.openxmlformats.org/drawingml/2006/table">
+            <a:tbl>
+              <a:tblPr rtl="1" firstRow="1" bandRow="1">
+                <a:tableStyleId>{5C22544A-7EE6-4342-B048-85BDC9FD1C3A}</a:tableStyleId>
+              </a:tblPr>
+              <a:tblGrid>
+                <a:gridCol w="2220341">
+                  <a:extLst>
+                    <a:ext uri="{9D8B030D-6E8A-4147-A177-3AD203B41FA5}">
+                      <a16:colId xmlns:a16="http://schemas.microsoft.com/office/drawing/2014/main" val="792085942"/>
+                    </a:ext>
+                  </a:extLst>
+                </a:gridCol>
+                <a:gridCol w="1501500">
+                  <a:extLst>
+                    <a:ext uri="{9D8B030D-6E8A-4147-A177-3AD203B41FA5}">
+                      <a16:colId xmlns:a16="http://schemas.microsoft.com/office/drawing/2014/main" val="4280172120"/>
+                    </a:ext>
+                  </a:extLst>
+                </a:gridCol>
+                <a:gridCol w="1501500">
+                  <a:extLst>
+                    <a:ext uri="{9D8B030D-6E8A-4147-A177-3AD203B41FA5}">
+                      <a16:colId xmlns:a16="http://schemas.microsoft.com/office/drawing/2014/main" val="93957943"/>
+                    </a:ext>
+                  </a:extLst>
+                </a:gridCol>
+              </a:tblGrid>
+              <a:tr h="370840">
+                <a:tc>
+                  <a:txBody>
+                    <a:bodyPr/>
+                    <a:lstStyle/>
+                    <a:p>
+                      <a:pPr rtl="1"/>
+                      <a:r>
+                        <a:rPr lang="en-US" dirty="0"/>
+                        <a:t>Best exploration rate</a:t>
+                      </a:r>
+                      <a:endParaRPr lang="he-IL" dirty="0"/>
+                    </a:p>
+                  </a:txBody>
+                  <a:tcPr/>
+                </a:tc>
+                <a:tc>
+                  <a:txBody>
+                    <a:bodyPr/>
+                    <a:lstStyle/>
+                    <a:p>
+                      <a:pPr marL="0" marR="0" lvl="0" indent="0" algn="l" defTabSz="914400" rtl="1" eaLnBrk="1" fontAlgn="auto" latinLnBrk="0" hangingPunct="1">
+                        <a:lnSpc>
+                          <a:spcPct val="100000"/>
+                        </a:lnSpc>
+                        <a:spcBef>
+                          <a:spcPts val="0"/>
+                        </a:spcBef>
+                        <a:spcAft>
+                          <a:spcPts val="0"/>
+                        </a:spcAft>
+                        <a:buClrTx/>
+                        <a:buSzTx/>
+                        <a:buFontTx/>
+                        <a:buNone/>
+                        <a:tabLst/>
+                        <a:defRPr/>
+                      </a:pPr>
+                      <a:r>
+                        <a:rPr lang="en-US" dirty="0"/>
+                        <a:t>Light size</a:t>
+                      </a:r>
+                      <a:endParaRPr lang="he-IL" dirty="0"/>
+                    </a:p>
+                  </a:txBody>
+                  <a:tcPr/>
+                </a:tc>
+                <a:tc>
+                  <a:txBody>
+                    <a:bodyPr/>
+                    <a:lstStyle/>
+                    <a:p>
+                      <a:pPr rtl="1"/>
+                      <a:r>
+                        <a:rPr lang="en-US" dirty="0"/>
+                        <a:t>Board size</a:t>
+                      </a:r>
+                      <a:endParaRPr lang="he-IL" dirty="0"/>
+                    </a:p>
+                  </a:txBody>
+                  <a:tcPr/>
+                </a:tc>
+                <a:extLst>
+                  <a:ext uri="{0D108BD9-81ED-4DB2-BD59-A6C34878D82A}">
+                    <a16:rowId xmlns:a16="http://schemas.microsoft.com/office/drawing/2014/main" val="2032929864"/>
+                  </a:ext>
+                </a:extLst>
+              </a:tr>
+              <a:tr h="370840">
+                <a:tc>
+                  <a:txBody>
+                    <a:bodyPr/>
+                    <a:lstStyle/>
+                    <a:p>
+                      <a:pPr rtl="1"/>
+                      <a:r>
+                        <a:rPr lang="en-US" dirty="0"/>
+                        <a:t>0.4</a:t>
+                      </a:r>
+                      <a:endParaRPr lang="he-IL" dirty="0"/>
+                    </a:p>
+                  </a:txBody>
+                  <a:tcPr/>
+                </a:tc>
+                <a:tc>
+                  <a:txBody>
+                    <a:bodyPr/>
+                    <a:lstStyle/>
+                    <a:p>
+                      <a:pPr rtl="1"/>
+                      <a:r>
+                        <a:rPr lang="en-US" dirty="0"/>
+                        <a:t>1</a:t>
+                      </a:r>
+                      <a:endParaRPr lang="he-IL" dirty="0"/>
+                    </a:p>
+                  </a:txBody>
+                  <a:tcPr/>
+                </a:tc>
+                <a:tc>
+                  <a:txBody>
+                    <a:bodyPr/>
+                    <a:lstStyle/>
+                    <a:p>
+                      <a:pPr rtl="1"/>
+                      <a:r>
+                        <a:rPr lang="en-US" dirty="0"/>
+                        <a:t>2x1</a:t>
+                      </a:r>
+                      <a:endParaRPr lang="he-IL" dirty="0"/>
+                    </a:p>
+                  </a:txBody>
+                  <a:tcPr/>
+                </a:tc>
+                <a:extLst>
+                  <a:ext uri="{0D108BD9-81ED-4DB2-BD59-A6C34878D82A}">
+                    <a16:rowId xmlns:a16="http://schemas.microsoft.com/office/drawing/2014/main" val="3441462291"/>
+                  </a:ext>
+                </a:extLst>
+              </a:tr>
+              <a:tr h="370840">
+                <a:tc>
+                  <a:txBody>
+                    <a:bodyPr/>
+                    <a:lstStyle/>
+                    <a:p>
+                      <a:pPr rtl="1"/>
+                      <a:r>
+                        <a:rPr lang="en-US" dirty="0"/>
+                        <a:t>0.2</a:t>
+                      </a:r>
+                      <a:endParaRPr lang="he-IL" dirty="0"/>
+                    </a:p>
+                  </a:txBody>
+                  <a:tcPr/>
+                </a:tc>
+                <a:tc>
+                  <a:txBody>
+                    <a:bodyPr/>
+                    <a:lstStyle/>
+                    <a:p>
+                      <a:pPr rtl="1"/>
+                      <a:r>
+                        <a:rPr lang="en-US" dirty="0"/>
+                        <a:t>2</a:t>
+                      </a:r>
+                      <a:endParaRPr lang="he-IL" dirty="0"/>
+                    </a:p>
+                  </a:txBody>
+                  <a:tcPr/>
+                </a:tc>
+                <a:tc>
+                  <a:txBody>
+                    <a:bodyPr/>
+                    <a:lstStyle/>
+                    <a:p>
+                      <a:pPr rtl="1"/>
+                      <a:r>
+                        <a:rPr lang="en-US" dirty="0"/>
+                        <a:t>4x2</a:t>
+                      </a:r>
+                      <a:endParaRPr lang="he-IL" dirty="0"/>
+                    </a:p>
+                  </a:txBody>
+                  <a:tcPr/>
+                </a:tc>
+                <a:extLst>
+                  <a:ext uri="{0D108BD9-81ED-4DB2-BD59-A6C34878D82A}">
+                    <a16:rowId xmlns:a16="http://schemas.microsoft.com/office/drawing/2014/main" val="2431461244"/>
+                  </a:ext>
+                </a:extLst>
+              </a:tr>
+              <a:tr h="370840">
+                <a:tc>
+                  <a:txBody>
+                    <a:bodyPr/>
+                    <a:lstStyle/>
+                    <a:p>
+                      <a:pPr rtl="1"/>
+                      <a:r>
+                        <a:rPr lang="en-US" dirty="0"/>
+                        <a:t>0.4</a:t>
+                      </a:r>
+                      <a:endParaRPr lang="he-IL" dirty="0"/>
+                    </a:p>
+                  </a:txBody>
+                  <a:tcPr/>
+                </a:tc>
+                <a:tc>
+                  <a:txBody>
+                    <a:bodyPr/>
+                    <a:lstStyle/>
+                    <a:p>
+                      <a:pPr rtl="1"/>
+                      <a:r>
+                        <a:rPr lang="en-US" dirty="0"/>
+                        <a:t>3</a:t>
+                      </a:r>
+                      <a:endParaRPr lang="he-IL" dirty="0"/>
+                    </a:p>
+                  </a:txBody>
+                  <a:tcPr/>
+                </a:tc>
+                <a:tc>
+                  <a:txBody>
+                    <a:bodyPr/>
+                    <a:lstStyle/>
+                    <a:p>
+                      <a:pPr rtl="1"/>
+                      <a:r>
+                        <a:rPr lang="en-US" dirty="0"/>
+                        <a:t>6x3 </a:t>
+                      </a:r>
+                      <a:endParaRPr lang="he-IL" dirty="0"/>
+                    </a:p>
+                  </a:txBody>
+                  <a:tcPr/>
+                </a:tc>
+                <a:extLst>
+                  <a:ext uri="{0D108BD9-81ED-4DB2-BD59-A6C34878D82A}">
+                    <a16:rowId xmlns:a16="http://schemas.microsoft.com/office/drawing/2014/main" val="1063426375"/>
+                  </a:ext>
+                </a:extLst>
+              </a:tr>
+              <a:tr h="370840">
+                <a:tc>
+                  <a:txBody>
+                    <a:bodyPr/>
+                    <a:lstStyle/>
+                    <a:p>
+                      <a:pPr rtl="1"/>
+                      <a:r>
+                        <a:rPr lang="en-US" dirty="0"/>
+                        <a:t>0.4</a:t>
+                      </a:r>
+                      <a:endParaRPr lang="he-IL" dirty="0"/>
+                    </a:p>
+                  </a:txBody>
+                  <a:tcPr/>
+                </a:tc>
+                <a:tc>
+                  <a:txBody>
+                    <a:bodyPr/>
+                    <a:lstStyle/>
+                    <a:p>
+                      <a:pPr rtl="1"/>
+                      <a:r>
+                        <a:rPr lang="en-US" dirty="0"/>
+                        <a:t>4</a:t>
+                      </a:r>
+                      <a:endParaRPr lang="he-IL" dirty="0"/>
+                    </a:p>
+                  </a:txBody>
+                  <a:tcPr/>
+                </a:tc>
+                <a:tc>
+                  <a:txBody>
+                    <a:bodyPr/>
+                    <a:lstStyle/>
+                    <a:p>
+                      <a:pPr rtl="1"/>
+                      <a:r>
+                        <a:rPr lang="en-US" dirty="0"/>
+                        <a:t>8x4</a:t>
+                      </a:r>
+                      <a:endParaRPr lang="he-IL" dirty="0"/>
+                    </a:p>
+                  </a:txBody>
+                  <a:tcPr/>
+                </a:tc>
+                <a:extLst>
+                  <a:ext uri="{0D108BD9-81ED-4DB2-BD59-A6C34878D82A}">
+                    <a16:rowId xmlns:a16="http://schemas.microsoft.com/office/drawing/2014/main" val="4212360361"/>
+                  </a:ext>
+                </a:extLst>
+              </a:tr>
+            </a:tbl>
+          </a:graphicData>
+        </a:graphic>
+      </p:graphicFrame>
+    </p:spTree>
+    <p:extLst>
+      <p:ext uri="{BB962C8B-B14F-4D97-AF65-F5344CB8AC3E}">
+        <p14:creationId xmlns:p14="http://schemas.microsoft.com/office/powerpoint/2010/main" val="2957975411"/>
+      </p:ext>
+    </p:extLst>
+  </p:cSld>
+  <p:clrMapOvr>
+    <a:masterClrMapping/>
+  </p:clrMapOvr>
+</p:sld>
+</file>
+
+<file path=ppt/slides/slide6.xml><?xml version="1.0" encoding="utf-8"?>
+<p:sld xmlns:a="http://schemas.openxmlformats.org/drawingml/2006/main" xmlns:r="http://schemas.openxmlformats.org/officeDocument/2006/relationships" xmlns:p="http://schemas.openxmlformats.org/presentationml/2006/main">
+  <p:cSld>
+    <p:spTree>
+      <p:nvGrpSpPr>
+        <p:cNvPr id="1" name=""/>
+        <p:cNvGrpSpPr/>
+        <p:nvPr/>
+      </p:nvGrpSpPr>
+      <p:grpSpPr>
+        <a:xfrm>
+          <a:off x="0" y="0"/>
+          <a:ext cx="0" cy="0"/>
+          <a:chOff x="0" y="0"/>
+          <a:chExt cx="0" cy="0"/>
+        </a:xfrm>
+      </p:grpSpPr>
+      <p:sp>
+        <p:nvSpPr>
+          <p:cNvPr id="2" name="Title 1">
+            <a:extLst>
+              <a:ext uri="{FF2B5EF4-FFF2-40B4-BE49-F238E27FC236}">
+                <a16:creationId xmlns:a16="http://schemas.microsoft.com/office/drawing/2014/main" id="{D81BCCC9-87A2-4507-B61F-6841D2BE9468}"/>
+              </a:ext>
+            </a:extLst>
+          </p:cNvPr>
+          <p:cNvSpPr>
+            <a:spLocks noGrp="1"/>
+          </p:cNvSpPr>
+          <p:nvPr>
+            <p:ph type="title"/>
+          </p:nvPr>
+        </p:nvSpPr>
+        <p:spPr/>
+        <p:txBody>
+          <a:bodyPr/>
+          <a:lstStyle/>
+          <a:p>
+            <a:r>
+              <a:rPr lang="en-US" dirty="0"/>
+              <a:t>MCTS evaluation – Board size of 2x1</a:t>
+            </a:r>
+            <a:endParaRPr lang="he-IL" dirty="0"/>
+          </a:p>
+        </p:txBody>
+      </p:sp>
+      <p:pic>
+        <p:nvPicPr>
+          <p:cNvPr id="6" name="Picture 5">
+            <a:extLst>
+              <a:ext uri="{FF2B5EF4-FFF2-40B4-BE49-F238E27FC236}">
+                <a16:creationId xmlns:a16="http://schemas.microsoft.com/office/drawing/2014/main" id="{C71DB5AA-E7D2-417F-B515-53B62DA53D89}"/>
+              </a:ext>
+            </a:extLst>
+          </p:cNvPr>
+          <p:cNvPicPr>
+            <a:picLocks noChangeAspect="1"/>
+          </p:cNvPicPr>
+          <p:nvPr/>
+        </p:nvPicPr>
+        <p:blipFill>
+          <a:blip r:embed="rId2"/>
+          <a:stretch>
+            <a:fillRect/>
+          </a:stretch>
+        </p:blipFill>
+        <p:spPr>
+          <a:xfrm>
+            <a:off x="0" y="1485403"/>
+            <a:ext cx="12192000" cy="4473789"/>
+          </a:xfrm>
+          <a:prstGeom prst="rect">
+            <a:avLst/>
+          </a:prstGeom>
+        </p:spPr>
+      </p:pic>
+      <p:sp>
+        <p:nvSpPr>
+          <p:cNvPr id="8" name="Rectangle: Rounded Corners 7">
+            <a:extLst>
+              <a:ext uri="{FF2B5EF4-FFF2-40B4-BE49-F238E27FC236}">
+                <a16:creationId xmlns:a16="http://schemas.microsoft.com/office/drawing/2014/main" id="{B30B9C05-2447-4C08-ADFD-404F35D0B8AA}"/>
+              </a:ext>
+            </a:extLst>
+          </p:cNvPr>
+          <p:cNvSpPr/>
+          <p:nvPr/>
+        </p:nvSpPr>
+        <p:spPr>
+          <a:xfrm>
+            <a:off x="5175849" y="1388853"/>
+            <a:ext cx="3605842" cy="1630392"/>
+          </a:xfrm>
+          <a:prstGeom prst="roundRect">
+            <a:avLst/>
+          </a:prstGeom>
+          <a:noFill/>
+          <a:ln w="38100">
+            <a:solidFill>
+              <a:srgbClr val="FF0000"/>
+            </a:solidFill>
+          </a:ln>
+        </p:spPr>
+        <p:style>
+          <a:lnRef idx="2">
+            <a:schemeClr val="accent1">
+              <a:shade val="50000"/>
+            </a:schemeClr>
+          </a:lnRef>
+          <a:fillRef idx="1">
+            <a:schemeClr val="accent1"/>
+          </a:fillRef>
+          <a:effectRef idx="0">
+            <a:schemeClr val="accent1"/>
+          </a:effectRef>
+          <a:fontRef idx="minor">
+            <a:schemeClr val="lt1"/>
+          </a:fontRef>
+        </p:style>
+        <p:txBody>
+          <a:bodyPr rtlCol="1" anchor="ctr"/>
+          <a:lstStyle/>
+          <a:p>
+            <a:pPr algn="ctr"/>
+            <a:endParaRPr lang="he-IL"/>
+          </a:p>
+        </p:txBody>
+      </p:sp>
+    </p:spTree>
+    <p:extLst>
+      <p:ext uri="{BB962C8B-B14F-4D97-AF65-F5344CB8AC3E}">
+        <p14:creationId xmlns:p14="http://schemas.microsoft.com/office/powerpoint/2010/main" val="3421551694"/>
+      </p:ext>
+    </p:extLst>
+  </p:cSld>
+  <p:clrMapOvr>
+    <a:masterClrMapping/>
+  </p:clrMapOvr>
+</p:sld>
+</file>
+
+<file path=ppt/slides/slide7.xml><?xml version="1.0" encoding="utf-8"?>
+<p:sld xmlns:a="http://schemas.openxmlformats.org/drawingml/2006/main" xmlns:r="http://schemas.openxmlformats.org/officeDocument/2006/relationships" xmlns:p="http://schemas.openxmlformats.org/presentationml/2006/main">
+  <p:cSld>
+    <p:spTree>
+      <p:nvGrpSpPr>
+        <p:cNvPr id="1" name=""/>
+        <p:cNvGrpSpPr/>
+        <p:nvPr/>
+      </p:nvGrpSpPr>
+      <p:grpSpPr>
+        <a:xfrm>
+          <a:off x="0" y="0"/>
+          <a:ext cx="0" cy="0"/>
+          <a:chOff x="0" y="0"/>
+          <a:chExt cx="0" cy="0"/>
+        </a:xfrm>
+      </p:grpSpPr>
+      <p:sp>
+        <p:nvSpPr>
+          <p:cNvPr id="2" name="Title 1">
+            <a:extLst>
+              <a:ext uri="{FF2B5EF4-FFF2-40B4-BE49-F238E27FC236}">
+                <a16:creationId xmlns:a16="http://schemas.microsoft.com/office/drawing/2014/main" id="{D81BCCC9-87A2-4507-B61F-6841D2BE9468}"/>
+              </a:ext>
+            </a:extLst>
+          </p:cNvPr>
+          <p:cNvSpPr>
+            <a:spLocks noGrp="1"/>
+          </p:cNvSpPr>
+          <p:nvPr>
+            <p:ph type="title"/>
+          </p:nvPr>
+        </p:nvSpPr>
+        <p:spPr/>
+        <p:txBody>
+          <a:bodyPr/>
+          <a:lstStyle/>
+          <a:p>
+            <a:r>
+              <a:rPr lang="en-US" dirty="0"/>
+              <a:t>MCTS evaluation – Board size of 4x2</a:t>
+            </a:r>
+            <a:endParaRPr lang="he-IL" dirty="0"/>
+          </a:p>
+        </p:txBody>
+      </p:sp>
+      <p:pic>
+        <p:nvPicPr>
+          <p:cNvPr id="7" name="Picture 6">
+            <a:extLst>
+              <a:ext uri="{FF2B5EF4-FFF2-40B4-BE49-F238E27FC236}">
+                <a16:creationId xmlns:a16="http://schemas.microsoft.com/office/drawing/2014/main" id="{6C9BB76C-7F6A-45BB-9A9A-7F96226D97ED}"/>
+              </a:ext>
+            </a:extLst>
+          </p:cNvPr>
+          <p:cNvPicPr>
+            <a:picLocks noChangeAspect="1"/>
+          </p:cNvPicPr>
+          <p:nvPr/>
+        </p:nvPicPr>
+        <p:blipFill>
+          <a:blip r:embed="rId2"/>
+          <a:stretch>
+            <a:fillRect/>
+          </a:stretch>
+        </p:blipFill>
+        <p:spPr>
+          <a:xfrm>
+            <a:off x="0" y="1445605"/>
+            <a:ext cx="12192000" cy="4967454"/>
+          </a:xfrm>
+          <a:prstGeom prst="rect">
+            <a:avLst/>
+          </a:prstGeom>
+        </p:spPr>
+      </p:pic>
+      <p:sp>
+        <p:nvSpPr>
+          <p:cNvPr id="9" name="Rectangle: Rounded Corners 8">
+            <a:extLst>
+              <a:ext uri="{FF2B5EF4-FFF2-40B4-BE49-F238E27FC236}">
+                <a16:creationId xmlns:a16="http://schemas.microsoft.com/office/drawing/2014/main" id="{EEED5E40-E936-427A-B711-01AFE7C99E3A}"/>
+              </a:ext>
+            </a:extLst>
+          </p:cNvPr>
+          <p:cNvSpPr/>
+          <p:nvPr/>
+        </p:nvSpPr>
+        <p:spPr>
+          <a:xfrm>
+            <a:off x="5175849" y="1388853"/>
+            <a:ext cx="3605842" cy="1630392"/>
+          </a:xfrm>
+          <a:prstGeom prst="roundRect">
+            <a:avLst/>
+          </a:prstGeom>
+          <a:noFill/>
+          <a:ln w="38100">
+            <a:solidFill>
+              <a:srgbClr val="FF0000"/>
+            </a:solidFill>
+          </a:ln>
+        </p:spPr>
+        <p:style>
+          <a:lnRef idx="2">
+            <a:schemeClr val="accent1">
+              <a:shade val="50000"/>
+            </a:schemeClr>
+          </a:lnRef>
+          <a:fillRef idx="1">
+            <a:schemeClr val="accent1"/>
+          </a:fillRef>
+          <a:effectRef idx="0">
+            <a:schemeClr val="accent1"/>
+          </a:effectRef>
+          <a:fontRef idx="minor">
+            <a:schemeClr val="lt1"/>
+          </a:fontRef>
+        </p:style>
+        <p:txBody>
+          <a:bodyPr rtlCol="1" anchor="ctr"/>
+          <a:lstStyle/>
+          <a:p>
+            <a:pPr algn="ctr"/>
+            <a:endParaRPr lang="he-IL"/>
+          </a:p>
+        </p:txBody>
+      </p:sp>
+    </p:spTree>
+    <p:extLst>
+      <p:ext uri="{BB962C8B-B14F-4D97-AF65-F5344CB8AC3E}">
+        <p14:creationId xmlns:p14="http://schemas.microsoft.com/office/powerpoint/2010/main" val="1836896729"/>
+      </p:ext>
+    </p:extLst>
+  </p:cSld>
+  <p:clrMapOvr>
+    <a:masterClrMapping/>
+  </p:clrMapOvr>
+</p:sld>
+</file>
+
+<file path=ppt/slides/slide8.xml><?xml version="1.0" encoding="utf-8"?>
+<p:sld xmlns:a="http://schemas.openxmlformats.org/drawingml/2006/main" xmlns:r="http://schemas.openxmlformats.org/officeDocument/2006/relationships" xmlns:p="http://schemas.openxmlformats.org/presentationml/2006/main">
+  <p:cSld>
+    <p:spTree>
+      <p:nvGrpSpPr>
+        <p:cNvPr id="1" name=""/>
+        <p:cNvGrpSpPr/>
+        <p:nvPr/>
+      </p:nvGrpSpPr>
+      <p:grpSpPr>
+        <a:xfrm>
+          <a:off x="0" y="0"/>
+          <a:ext cx="0" cy="0"/>
+          <a:chOff x="0" y="0"/>
+          <a:chExt cx="0" cy="0"/>
+        </a:xfrm>
+      </p:grpSpPr>
+      <p:sp>
+        <p:nvSpPr>
+          <p:cNvPr id="2" name="Title 1">
+            <a:extLst>
+              <a:ext uri="{FF2B5EF4-FFF2-40B4-BE49-F238E27FC236}">
+                <a16:creationId xmlns:a16="http://schemas.microsoft.com/office/drawing/2014/main" id="{D81BCCC9-87A2-4507-B61F-6841D2BE9468}"/>
+              </a:ext>
+            </a:extLst>
+          </p:cNvPr>
+          <p:cNvSpPr>
+            <a:spLocks noGrp="1"/>
+          </p:cNvSpPr>
+          <p:nvPr>
+            <p:ph type="title"/>
+          </p:nvPr>
+        </p:nvSpPr>
+        <p:spPr/>
+        <p:txBody>
+          <a:bodyPr/>
+          <a:lstStyle/>
+          <a:p>
+            <a:r>
+              <a:rPr lang="en-US" dirty="0"/>
+              <a:t>MCTS evaluation – Board size of 6x3</a:t>
+            </a:r>
+            <a:endParaRPr lang="he-IL" dirty="0"/>
+          </a:p>
+        </p:txBody>
+      </p:sp>
+      <p:pic>
+        <p:nvPicPr>
+          <p:cNvPr id="7" name="Picture 6">
+            <a:extLst>
+              <a:ext uri="{FF2B5EF4-FFF2-40B4-BE49-F238E27FC236}">
+                <a16:creationId xmlns:a16="http://schemas.microsoft.com/office/drawing/2014/main" id="{6B4129FB-BC30-47E3-B30E-997734DE5961}"/>
+              </a:ext>
+            </a:extLst>
+          </p:cNvPr>
+          <p:cNvPicPr>
+            <a:picLocks noChangeAspect="1"/>
+          </p:cNvPicPr>
+          <p:nvPr/>
+        </p:nvPicPr>
+        <p:blipFill>
+          <a:blip r:embed="rId2"/>
+          <a:stretch>
+            <a:fillRect/>
+          </a:stretch>
+        </p:blipFill>
+        <p:spPr>
+          <a:xfrm>
+            <a:off x="0" y="1478559"/>
+            <a:ext cx="12192000" cy="4729018"/>
+          </a:xfrm>
+          <a:prstGeom prst="rect">
+            <a:avLst/>
+          </a:prstGeom>
+        </p:spPr>
+      </p:pic>
+      <p:sp>
+        <p:nvSpPr>
+          <p:cNvPr id="9" name="Rectangle: Rounded Corners 8">
+            <a:extLst>
+              <a:ext uri="{FF2B5EF4-FFF2-40B4-BE49-F238E27FC236}">
+                <a16:creationId xmlns:a16="http://schemas.microsoft.com/office/drawing/2014/main" id="{17A26CA3-7A1B-4B52-AC91-2F2104242BFB}"/>
+              </a:ext>
+            </a:extLst>
+          </p:cNvPr>
+          <p:cNvSpPr/>
+          <p:nvPr/>
+        </p:nvSpPr>
+        <p:spPr>
+          <a:xfrm>
+            <a:off x="6970143" y="1319843"/>
+            <a:ext cx="3605842" cy="1630392"/>
+          </a:xfrm>
+          <a:prstGeom prst="roundRect">
+            <a:avLst/>
+          </a:prstGeom>
+          <a:noFill/>
+          <a:ln w="38100">
+            <a:solidFill>
+              <a:srgbClr val="FF0000"/>
+            </a:solidFill>
+          </a:ln>
+        </p:spPr>
+        <p:style>
+          <a:lnRef idx="2">
+            <a:schemeClr val="accent1">
+              <a:shade val="50000"/>
+            </a:schemeClr>
+          </a:lnRef>
+          <a:fillRef idx="1">
+            <a:schemeClr val="accent1"/>
+          </a:fillRef>
+          <a:effectRef idx="0">
+            <a:schemeClr val="accent1"/>
+          </a:effectRef>
+          <a:fontRef idx="minor">
+            <a:schemeClr val="lt1"/>
+          </a:fontRef>
+        </p:style>
+        <p:txBody>
+          <a:bodyPr rtlCol="1" anchor="ctr"/>
+          <a:lstStyle/>
+          <a:p>
+            <a:pPr algn="ctr"/>
+            <a:endParaRPr lang="he-IL"/>
+          </a:p>
+        </p:txBody>
+      </p:sp>
+    </p:spTree>
+    <p:extLst>
+      <p:ext uri="{BB962C8B-B14F-4D97-AF65-F5344CB8AC3E}">
+        <p14:creationId xmlns:p14="http://schemas.microsoft.com/office/powerpoint/2010/main" val="3005984590"/>
+      </p:ext>
+    </p:extLst>
+  </p:cSld>
+  <p:clrMapOvr>
+    <a:masterClrMapping/>
+  </p:clrMapOvr>
+</p:sld>
+</file>
+
+<file path=ppt/slides/slide9.xml><?xml version="1.0" encoding="utf-8"?>
+<p:sld xmlns:a="http://schemas.openxmlformats.org/drawingml/2006/main" xmlns:r="http://schemas.openxmlformats.org/officeDocument/2006/relationships" xmlns:p="http://schemas.openxmlformats.org/presentationml/2006/main">
+  <p:cSld>
+    <p:spTree>
+      <p:nvGrpSpPr>
+        <p:cNvPr id="1" name=""/>
+        <p:cNvGrpSpPr/>
+        <p:nvPr/>
+      </p:nvGrpSpPr>
+      <p:grpSpPr>
+        <a:xfrm>
+          <a:off x="0" y="0"/>
+          <a:ext cx="0" cy="0"/>
+          <a:chOff x="0" y="0"/>
+          <a:chExt cx="0" cy="0"/>
+        </a:xfrm>
+      </p:grpSpPr>
+      <p:sp>
+        <p:nvSpPr>
+          <p:cNvPr id="2" name="Title 1">
+            <a:extLst>
+              <a:ext uri="{FF2B5EF4-FFF2-40B4-BE49-F238E27FC236}">
+                <a16:creationId xmlns:a16="http://schemas.microsoft.com/office/drawing/2014/main" id="{D81BCCC9-87A2-4507-B61F-6841D2BE9468}"/>
+              </a:ext>
+            </a:extLst>
+          </p:cNvPr>
+          <p:cNvSpPr>
+            <a:spLocks noGrp="1"/>
+          </p:cNvSpPr>
+          <p:nvPr>
+            <p:ph type="title"/>
+          </p:nvPr>
+        </p:nvSpPr>
+        <p:spPr/>
+        <p:txBody>
+          <a:bodyPr/>
+          <a:lstStyle/>
+          <a:p>
+            <a:r>
+              <a:rPr lang="en-US" dirty="0"/>
+              <a:t>MCTS evaluation – Board size of 8x4</a:t>
+            </a:r>
+            <a:endParaRPr lang="he-IL" dirty="0"/>
+          </a:p>
+        </p:txBody>
+      </p:sp>
+      <p:pic>
+        <p:nvPicPr>
+          <p:cNvPr id="7" name="Picture 6">
+            <a:extLst>
+              <a:ext uri="{FF2B5EF4-FFF2-40B4-BE49-F238E27FC236}">
+                <a16:creationId xmlns:a16="http://schemas.microsoft.com/office/drawing/2014/main" id="{CF01B3CD-8D8E-45D9-ABD8-35C53A5C7618}"/>
+              </a:ext>
+            </a:extLst>
+          </p:cNvPr>
+          <p:cNvPicPr>
+            <a:picLocks noChangeAspect="1"/>
+          </p:cNvPicPr>
+          <p:nvPr/>
+        </p:nvPicPr>
+        <p:blipFill>
+          <a:blip r:embed="rId2"/>
+          <a:stretch>
+            <a:fillRect/>
+          </a:stretch>
+        </p:blipFill>
+        <p:spPr>
+          <a:xfrm>
+            <a:off x="0" y="1372502"/>
+            <a:ext cx="12192000" cy="5044648"/>
+          </a:xfrm>
+          <a:prstGeom prst="rect">
+            <a:avLst/>
+          </a:prstGeom>
+        </p:spPr>
+      </p:pic>
+      <p:sp>
+        <p:nvSpPr>
+          <p:cNvPr id="9" name="Rectangle: Rounded Corners 8">
+            <a:extLst>
+              <a:ext uri="{FF2B5EF4-FFF2-40B4-BE49-F238E27FC236}">
+                <a16:creationId xmlns:a16="http://schemas.microsoft.com/office/drawing/2014/main" id="{1F927621-9573-4B68-9709-A0875BD51C7D}"/>
+              </a:ext>
+            </a:extLst>
+          </p:cNvPr>
+          <p:cNvSpPr/>
+          <p:nvPr/>
+        </p:nvSpPr>
+        <p:spPr>
+          <a:xfrm>
+            <a:off x="5175849" y="1372502"/>
+            <a:ext cx="3605842" cy="1551853"/>
+          </a:xfrm>
+          <a:prstGeom prst="roundRect">
+            <a:avLst/>
+          </a:prstGeom>
+          <a:noFill/>
+          <a:ln w="38100">
+            <a:solidFill>
+              <a:srgbClr val="FF0000"/>
+            </a:solidFill>
+          </a:ln>
+        </p:spPr>
+        <p:style>
+          <a:lnRef idx="2">
+            <a:schemeClr val="accent1">
+              <a:shade val="50000"/>
+            </a:schemeClr>
+          </a:lnRef>
+          <a:fillRef idx="1">
+            <a:schemeClr val="accent1"/>
+          </a:fillRef>
+          <a:effectRef idx="0">
+            <a:schemeClr val="accent1"/>
+          </a:effectRef>
+          <a:fontRef idx="minor">
+            <a:schemeClr val="lt1"/>
+          </a:fontRef>
+        </p:style>
+        <p:txBody>
+          <a:bodyPr rtlCol="1" anchor="ctr"/>
+          <a:lstStyle/>
+          <a:p>
+            <a:pPr algn="ctr"/>
+            <a:endParaRPr lang="he-IL"/>
+          </a:p>
+        </p:txBody>
+      </p:sp>
+    </p:spTree>
+    <p:extLst>
+      <p:ext uri="{BB962C8B-B14F-4D97-AF65-F5344CB8AC3E}">
+        <p14:creationId xmlns:p14="http://schemas.microsoft.com/office/powerpoint/2010/main" val="3481719044"/>
       </p:ext>
     </p:extLst>
   </p:cSld>

</xml_diff>